<commit_message>
actualizacion por Katherine Williams
</commit_message>
<xml_diff>
--- a/img/carrusel/Presentación1.pptx
+++ b/img/carrusel/Presentación1.pptx
@@ -6,14 +6,14 @@
   </p:sldMasterIdLst>
   <p:sldIdLst>
     <p:sldId id="256" r:id="rId2"/>
-    <p:sldId id="257" r:id="rId3"/>
-    <p:sldId id="258" r:id="rId4"/>
+    <p:sldId id="258" r:id="rId3"/>
+    <p:sldId id="257" r:id="rId4"/>
   </p:sldIdLst>
   <p:sldSz cx="12192000" cy="6858000"/>
   <p:notesSz cx="6858000" cy="9144000"/>
   <p:defaultTextStyle>
     <a:defPPr>
-      <a:defRPr lang="es-ES"/>
+      <a:defRPr lang="en-US"/>
     </a:defPPr>
     <a:lvl1pPr marL="0" algn="l" defTabSz="914400" rtl="0" eaLnBrk="1" latinLnBrk="0" hangingPunct="1">
       <a:defRPr sz="1800" kern="1200">
@@ -154,7 +154,7 @@
               <a:rPr lang="es-ES" smtClean="0"/>
               <a:t>Haga clic para modificar el estilo de título del patrón</a:t>
             </a:r>
-            <a:endParaRPr lang="es-ES"/>
+            <a:endParaRPr lang="en-US"/>
           </a:p>
         </p:txBody>
       </p:sp>
@@ -219,7 +219,7 @@
               <a:rPr lang="es-ES" smtClean="0"/>
               <a:t>Haga clic para modificar el estilo de subtítulo del patrón</a:t>
             </a:r>
-            <a:endParaRPr lang="es-ES"/>
+            <a:endParaRPr lang="en-US"/>
           </a:p>
         </p:txBody>
       </p:sp>
@@ -238,11 +238,11 @@
           <a:bodyPr/>
           <a:lstStyle/>
           <a:p>
-            <a:fld id="{CB7C35F1-2967-47B1-ABA0-D6ECBDD2FDCA}" type="datetimeFigureOut">
-              <a:rPr lang="es-ES" smtClean="0"/>
-              <a:t>06/08/2018</a:t>
+            <a:fld id="{87C21B04-3BFD-4195-953B-842DE72845A9}" type="datetimeFigureOut">
+              <a:rPr lang="en-US" smtClean="0"/>
+              <a:t>8/20/2018</a:t>
             </a:fld>
-            <a:endParaRPr lang="es-ES"/>
+            <a:endParaRPr lang="en-US"/>
           </a:p>
         </p:txBody>
       </p:sp>
@@ -261,7 +261,7 @@
           <a:bodyPr/>
           <a:lstStyle/>
           <a:p>
-            <a:endParaRPr lang="es-ES"/>
+            <a:endParaRPr lang="en-US"/>
           </a:p>
         </p:txBody>
       </p:sp>
@@ -280,18 +280,18 @@
           <a:bodyPr/>
           <a:lstStyle/>
           <a:p>
-            <a:fld id="{2AC86D11-95AB-4D54-A55D-3E4BE70CA48F}" type="slidenum">
-              <a:rPr lang="es-ES" smtClean="0"/>
+            <a:fld id="{282D6D79-DA7E-4C38-B43B-8F3E90E82397}" type="slidenum">
+              <a:rPr lang="en-US" smtClean="0"/>
               <a:t>‹Nº›</a:t>
             </a:fld>
-            <a:endParaRPr lang="es-ES"/>
+            <a:endParaRPr lang="en-US"/>
           </a:p>
         </p:txBody>
       </p:sp>
     </p:spTree>
     <p:extLst>
       <p:ext uri="{BB962C8B-B14F-4D97-AF65-F5344CB8AC3E}">
-        <p14:creationId xmlns:p14="http://schemas.microsoft.com/office/powerpoint/2010/main" val="651000721"/>
+        <p14:creationId xmlns:p14="http://schemas.microsoft.com/office/powerpoint/2010/main" val="4138249826"/>
       </p:ext>
     </p:extLst>
   </p:cSld>
@@ -337,7 +337,7 @@
               <a:rPr lang="es-ES" smtClean="0"/>
               <a:t>Haga clic para modificar el estilo de título del patrón</a:t>
             </a:r>
-            <a:endParaRPr lang="es-ES"/>
+            <a:endParaRPr lang="en-US"/>
           </a:p>
         </p:txBody>
       </p:sp>
@@ -389,7 +389,7 @@
               <a:rPr lang="es-ES" smtClean="0"/>
               <a:t>Quinto nivel</a:t>
             </a:r>
-            <a:endParaRPr lang="es-ES"/>
+            <a:endParaRPr lang="en-US"/>
           </a:p>
         </p:txBody>
       </p:sp>
@@ -408,11 +408,11 @@
           <a:bodyPr/>
           <a:lstStyle/>
           <a:p>
-            <a:fld id="{CB7C35F1-2967-47B1-ABA0-D6ECBDD2FDCA}" type="datetimeFigureOut">
-              <a:rPr lang="es-ES" smtClean="0"/>
-              <a:t>06/08/2018</a:t>
+            <a:fld id="{87C21B04-3BFD-4195-953B-842DE72845A9}" type="datetimeFigureOut">
+              <a:rPr lang="en-US" smtClean="0"/>
+              <a:t>8/20/2018</a:t>
             </a:fld>
-            <a:endParaRPr lang="es-ES"/>
+            <a:endParaRPr lang="en-US"/>
           </a:p>
         </p:txBody>
       </p:sp>
@@ -431,7 +431,7 @@
           <a:bodyPr/>
           <a:lstStyle/>
           <a:p>
-            <a:endParaRPr lang="es-ES"/>
+            <a:endParaRPr lang="en-US"/>
           </a:p>
         </p:txBody>
       </p:sp>
@@ -450,18 +450,18 @@
           <a:bodyPr/>
           <a:lstStyle/>
           <a:p>
-            <a:fld id="{2AC86D11-95AB-4D54-A55D-3E4BE70CA48F}" type="slidenum">
-              <a:rPr lang="es-ES" smtClean="0"/>
+            <a:fld id="{282D6D79-DA7E-4C38-B43B-8F3E90E82397}" type="slidenum">
+              <a:rPr lang="en-US" smtClean="0"/>
               <a:t>‹Nº›</a:t>
             </a:fld>
-            <a:endParaRPr lang="es-ES"/>
+            <a:endParaRPr lang="en-US"/>
           </a:p>
         </p:txBody>
       </p:sp>
     </p:spTree>
     <p:extLst>
       <p:ext uri="{BB962C8B-B14F-4D97-AF65-F5344CB8AC3E}">
-        <p14:creationId xmlns:p14="http://schemas.microsoft.com/office/powerpoint/2010/main" val="4272878317"/>
+        <p14:creationId xmlns:p14="http://schemas.microsoft.com/office/powerpoint/2010/main" val="3090923053"/>
       </p:ext>
     </p:extLst>
   </p:cSld>
@@ -512,7 +512,7 @@
               <a:rPr lang="es-ES" smtClean="0"/>
               <a:t>Haga clic para modificar el estilo de título del patrón</a:t>
             </a:r>
-            <a:endParaRPr lang="es-ES"/>
+            <a:endParaRPr lang="en-US"/>
           </a:p>
         </p:txBody>
       </p:sp>
@@ -569,7 +569,7 @@
               <a:rPr lang="es-ES" smtClean="0"/>
               <a:t>Quinto nivel</a:t>
             </a:r>
-            <a:endParaRPr lang="es-ES"/>
+            <a:endParaRPr lang="en-US"/>
           </a:p>
         </p:txBody>
       </p:sp>
@@ -588,11 +588,11 @@
           <a:bodyPr/>
           <a:lstStyle/>
           <a:p>
-            <a:fld id="{CB7C35F1-2967-47B1-ABA0-D6ECBDD2FDCA}" type="datetimeFigureOut">
-              <a:rPr lang="es-ES" smtClean="0"/>
-              <a:t>06/08/2018</a:t>
+            <a:fld id="{87C21B04-3BFD-4195-953B-842DE72845A9}" type="datetimeFigureOut">
+              <a:rPr lang="en-US" smtClean="0"/>
+              <a:t>8/20/2018</a:t>
             </a:fld>
-            <a:endParaRPr lang="es-ES"/>
+            <a:endParaRPr lang="en-US"/>
           </a:p>
         </p:txBody>
       </p:sp>
@@ -611,7 +611,7 @@
           <a:bodyPr/>
           <a:lstStyle/>
           <a:p>
-            <a:endParaRPr lang="es-ES"/>
+            <a:endParaRPr lang="en-US"/>
           </a:p>
         </p:txBody>
       </p:sp>
@@ -630,18 +630,18 @@
           <a:bodyPr/>
           <a:lstStyle/>
           <a:p>
-            <a:fld id="{2AC86D11-95AB-4D54-A55D-3E4BE70CA48F}" type="slidenum">
-              <a:rPr lang="es-ES" smtClean="0"/>
+            <a:fld id="{282D6D79-DA7E-4C38-B43B-8F3E90E82397}" type="slidenum">
+              <a:rPr lang="en-US" smtClean="0"/>
               <a:t>‹Nº›</a:t>
             </a:fld>
-            <a:endParaRPr lang="es-ES"/>
+            <a:endParaRPr lang="en-US"/>
           </a:p>
         </p:txBody>
       </p:sp>
     </p:spTree>
     <p:extLst>
       <p:ext uri="{BB962C8B-B14F-4D97-AF65-F5344CB8AC3E}">
-        <p14:creationId xmlns:p14="http://schemas.microsoft.com/office/powerpoint/2010/main" val="1394968067"/>
+        <p14:creationId xmlns:p14="http://schemas.microsoft.com/office/powerpoint/2010/main" val="4173914836"/>
       </p:ext>
     </p:extLst>
   </p:cSld>
@@ -687,7 +687,7 @@
               <a:rPr lang="es-ES" smtClean="0"/>
               <a:t>Haga clic para modificar el estilo de título del patrón</a:t>
             </a:r>
-            <a:endParaRPr lang="es-ES"/>
+            <a:endParaRPr lang="en-US"/>
           </a:p>
         </p:txBody>
       </p:sp>
@@ -739,7 +739,7 @@
               <a:rPr lang="es-ES" smtClean="0"/>
               <a:t>Quinto nivel</a:t>
             </a:r>
-            <a:endParaRPr lang="es-ES"/>
+            <a:endParaRPr lang="en-US"/>
           </a:p>
         </p:txBody>
       </p:sp>
@@ -758,11 +758,11 @@
           <a:bodyPr/>
           <a:lstStyle/>
           <a:p>
-            <a:fld id="{CB7C35F1-2967-47B1-ABA0-D6ECBDD2FDCA}" type="datetimeFigureOut">
-              <a:rPr lang="es-ES" smtClean="0"/>
-              <a:t>06/08/2018</a:t>
+            <a:fld id="{87C21B04-3BFD-4195-953B-842DE72845A9}" type="datetimeFigureOut">
+              <a:rPr lang="en-US" smtClean="0"/>
+              <a:t>8/20/2018</a:t>
             </a:fld>
-            <a:endParaRPr lang="es-ES"/>
+            <a:endParaRPr lang="en-US"/>
           </a:p>
         </p:txBody>
       </p:sp>
@@ -781,7 +781,7 @@
           <a:bodyPr/>
           <a:lstStyle/>
           <a:p>
-            <a:endParaRPr lang="es-ES"/>
+            <a:endParaRPr lang="en-US"/>
           </a:p>
         </p:txBody>
       </p:sp>
@@ -800,18 +800,18 @@
           <a:bodyPr/>
           <a:lstStyle/>
           <a:p>
-            <a:fld id="{2AC86D11-95AB-4D54-A55D-3E4BE70CA48F}" type="slidenum">
-              <a:rPr lang="es-ES" smtClean="0"/>
+            <a:fld id="{282D6D79-DA7E-4C38-B43B-8F3E90E82397}" type="slidenum">
+              <a:rPr lang="en-US" smtClean="0"/>
               <a:t>‹Nº›</a:t>
             </a:fld>
-            <a:endParaRPr lang="es-ES"/>
+            <a:endParaRPr lang="en-US"/>
           </a:p>
         </p:txBody>
       </p:sp>
     </p:spTree>
     <p:extLst>
       <p:ext uri="{BB962C8B-B14F-4D97-AF65-F5344CB8AC3E}">
-        <p14:creationId xmlns:p14="http://schemas.microsoft.com/office/powerpoint/2010/main" val="673281061"/>
+        <p14:creationId xmlns:p14="http://schemas.microsoft.com/office/powerpoint/2010/main" val="2085084184"/>
       </p:ext>
     </p:extLst>
   </p:cSld>
@@ -866,7 +866,7 @@
               <a:rPr lang="es-ES" smtClean="0"/>
               <a:t>Haga clic para modificar el estilo de título del patrón</a:t>
             </a:r>
-            <a:endParaRPr lang="es-ES"/>
+            <a:endParaRPr lang="en-US"/>
           </a:p>
         </p:txBody>
       </p:sp>
@@ -1004,11 +1004,11 @@
           <a:bodyPr/>
           <a:lstStyle/>
           <a:p>
-            <a:fld id="{CB7C35F1-2967-47B1-ABA0-D6ECBDD2FDCA}" type="datetimeFigureOut">
-              <a:rPr lang="es-ES" smtClean="0"/>
-              <a:t>06/08/2018</a:t>
+            <a:fld id="{87C21B04-3BFD-4195-953B-842DE72845A9}" type="datetimeFigureOut">
+              <a:rPr lang="en-US" smtClean="0"/>
+              <a:t>8/20/2018</a:t>
             </a:fld>
-            <a:endParaRPr lang="es-ES"/>
+            <a:endParaRPr lang="en-US"/>
           </a:p>
         </p:txBody>
       </p:sp>
@@ -1027,7 +1027,7 @@
           <a:bodyPr/>
           <a:lstStyle/>
           <a:p>
-            <a:endParaRPr lang="es-ES"/>
+            <a:endParaRPr lang="en-US"/>
           </a:p>
         </p:txBody>
       </p:sp>
@@ -1046,18 +1046,18 @@
           <a:bodyPr/>
           <a:lstStyle/>
           <a:p>
-            <a:fld id="{2AC86D11-95AB-4D54-A55D-3E4BE70CA48F}" type="slidenum">
-              <a:rPr lang="es-ES" smtClean="0"/>
+            <a:fld id="{282D6D79-DA7E-4C38-B43B-8F3E90E82397}" type="slidenum">
+              <a:rPr lang="en-US" smtClean="0"/>
               <a:t>‹Nº›</a:t>
             </a:fld>
-            <a:endParaRPr lang="es-ES"/>
+            <a:endParaRPr lang="en-US"/>
           </a:p>
         </p:txBody>
       </p:sp>
     </p:spTree>
     <p:extLst>
       <p:ext uri="{BB962C8B-B14F-4D97-AF65-F5344CB8AC3E}">
-        <p14:creationId xmlns:p14="http://schemas.microsoft.com/office/powerpoint/2010/main" val="793594111"/>
+        <p14:creationId xmlns:p14="http://schemas.microsoft.com/office/powerpoint/2010/main" val="2511605569"/>
       </p:ext>
     </p:extLst>
   </p:cSld>
@@ -1103,7 +1103,7 @@
               <a:rPr lang="es-ES" smtClean="0"/>
               <a:t>Haga clic para modificar el estilo de título del patrón</a:t>
             </a:r>
-            <a:endParaRPr lang="es-ES"/>
+            <a:endParaRPr lang="en-US"/>
           </a:p>
         </p:txBody>
       </p:sp>
@@ -1160,7 +1160,7 @@
               <a:rPr lang="es-ES" smtClean="0"/>
               <a:t>Quinto nivel</a:t>
             </a:r>
-            <a:endParaRPr lang="es-ES"/>
+            <a:endParaRPr lang="en-US"/>
           </a:p>
         </p:txBody>
       </p:sp>
@@ -1217,7 +1217,7 @@
               <a:rPr lang="es-ES" smtClean="0"/>
               <a:t>Quinto nivel</a:t>
             </a:r>
-            <a:endParaRPr lang="es-ES"/>
+            <a:endParaRPr lang="en-US"/>
           </a:p>
         </p:txBody>
       </p:sp>
@@ -1236,11 +1236,11 @@
           <a:bodyPr/>
           <a:lstStyle/>
           <a:p>
-            <a:fld id="{CB7C35F1-2967-47B1-ABA0-D6ECBDD2FDCA}" type="datetimeFigureOut">
-              <a:rPr lang="es-ES" smtClean="0"/>
-              <a:t>06/08/2018</a:t>
+            <a:fld id="{87C21B04-3BFD-4195-953B-842DE72845A9}" type="datetimeFigureOut">
+              <a:rPr lang="en-US" smtClean="0"/>
+              <a:t>8/20/2018</a:t>
             </a:fld>
-            <a:endParaRPr lang="es-ES"/>
+            <a:endParaRPr lang="en-US"/>
           </a:p>
         </p:txBody>
       </p:sp>
@@ -1259,7 +1259,7 @@
           <a:bodyPr/>
           <a:lstStyle/>
           <a:p>
-            <a:endParaRPr lang="es-ES"/>
+            <a:endParaRPr lang="en-US"/>
           </a:p>
         </p:txBody>
       </p:sp>
@@ -1278,18 +1278,18 @@
           <a:bodyPr/>
           <a:lstStyle/>
           <a:p>
-            <a:fld id="{2AC86D11-95AB-4D54-A55D-3E4BE70CA48F}" type="slidenum">
-              <a:rPr lang="es-ES" smtClean="0"/>
+            <a:fld id="{282D6D79-DA7E-4C38-B43B-8F3E90E82397}" type="slidenum">
+              <a:rPr lang="en-US" smtClean="0"/>
               <a:t>‹Nº›</a:t>
             </a:fld>
-            <a:endParaRPr lang="es-ES"/>
+            <a:endParaRPr lang="en-US"/>
           </a:p>
         </p:txBody>
       </p:sp>
     </p:spTree>
     <p:extLst>
       <p:ext uri="{BB962C8B-B14F-4D97-AF65-F5344CB8AC3E}">
-        <p14:creationId xmlns:p14="http://schemas.microsoft.com/office/powerpoint/2010/main" val="129620926"/>
+        <p14:creationId xmlns:p14="http://schemas.microsoft.com/office/powerpoint/2010/main" val="1710506630"/>
       </p:ext>
     </p:extLst>
   </p:cSld>
@@ -1340,7 +1340,7 @@
               <a:rPr lang="es-ES" smtClean="0"/>
               <a:t>Haga clic para modificar el estilo de título del patrón</a:t>
             </a:r>
-            <a:endParaRPr lang="es-ES"/>
+            <a:endParaRPr lang="en-US"/>
           </a:p>
         </p:txBody>
       </p:sp>
@@ -1462,7 +1462,7 @@
               <a:rPr lang="es-ES" smtClean="0"/>
               <a:t>Quinto nivel</a:t>
             </a:r>
-            <a:endParaRPr lang="es-ES"/>
+            <a:endParaRPr lang="en-US"/>
           </a:p>
         </p:txBody>
       </p:sp>
@@ -1584,7 +1584,7 @@
               <a:rPr lang="es-ES" smtClean="0"/>
               <a:t>Quinto nivel</a:t>
             </a:r>
-            <a:endParaRPr lang="es-ES"/>
+            <a:endParaRPr lang="en-US"/>
           </a:p>
         </p:txBody>
       </p:sp>
@@ -1603,11 +1603,11 @@
           <a:bodyPr/>
           <a:lstStyle/>
           <a:p>
-            <a:fld id="{CB7C35F1-2967-47B1-ABA0-D6ECBDD2FDCA}" type="datetimeFigureOut">
-              <a:rPr lang="es-ES" smtClean="0"/>
-              <a:t>06/08/2018</a:t>
+            <a:fld id="{87C21B04-3BFD-4195-953B-842DE72845A9}" type="datetimeFigureOut">
+              <a:rPr lang="en-US" smtClean="0"/>
+              <a:t>8/20/2018</a:t>
             </a:fld>
-            <a:endParaRPr lang="es-ES"/>
+            <a:endParaRPr lang="en-US"/>
           </a:p>
         </p:txBody>
       </p:sp>
@@ -1626,7 +1626,7 @@
           <a:bodyPr/>
           <a:lstStyle/>
           <a:p>
-            <a:endParaRPr lang="es-ES"/>
+            <a:endParaRPr lang="en-US"/>
           </a:p>
         </p:txBody>
       </p:sp>
@@ -1645,18 +1645,18 @@
           <a:bodyPr/>
           <a:lstStyle/>
           <a:p>
-            <a:fld id="{2AC86D11-95AB-4D54-A55D-3E4BE70CA48F}" type="slidenum">
-              <a:rPr lang="es-ES" smtClean="0"/>
+            <a:fld id="{282D6D79-DA7E-4C38-B43B-8F3E90E82397}" type="slidenum">
+              <a:rPr lang="en-US" smtClean="0"/>
               <a:t>‹Nº›</a:t>
             </a:fld>
-            <a:endParaRPr lang="es-ES"/>
+            <a:endParaRPr lang="en-US"/>
           </a:p>
         </p:txBody>
       </p:sp>
     </p:spTree>
     <p:extLst>
       <p:ext uri="{BB962C8B-B14F-4D97-AF65-F5344CB8AC3E}">
-        <p14:creationId xmlns:p14="http://schemas.microsoft.com/office/powerpoint/2010/main" val="2581025708"/>
+        <p14:creationId xmlns:p14="http://schemas.microsoft.com/office/powerpoint/2010/main" val="2819241074"/>
       </p:ext>
     </p:extLst>
   </p:cSld>
@@ -1702,7 +1702,7 @@
               <a:rPr lang="es-ES" smtClean="0"/>
               <a:t>Haga clic para modificar el estilo de título del patrón</a:t>
             </a:r>
-            <a:endParaRPr lang="es-ES"/>
+            <a:endParaRPr lang="en-US"/>
           </a:p>
         </p:txBody>
       </p:sp>
@@ -1721,11 +1721,11 @@
           <a:bodyPr/>
           <a:lstStyle/>
           <a:p>
-            <a:fld id="{CB7C35F1-2967-47B1-ABA0-D6ECBDD2FDCA}" type="datetimeFigureOut">
-              <a:rPr lang="es-ES" smtClean="0"/>
-              <a:t>06/08/2018</a:t>
+            <a:fld id="{87C21B04-3BFD-4195-953B-842DE72845A9}" type="datetimeFigureOut">
+              <a:rPr lang="en-US" smtClean="0"/>
+              <a:t>8/20/2018</a:t>
             </a:fld>
-            <a:endParaRPr lang="es-ES"/>
+            <a:endParaRPr lang="en-US"/>
           </a:p>
         </p:txBody>
       </p:sp>
@@ -1744,7 +1744,7 @@
           <a:bodyPr/>
           <a:lstStyle/>
           <a:p>
-            <a:endParaRPr lang="es-ES"/>
+            <a:endParaRPr lang="en-US"/>
           </a:p>
         </p:txBody>
       </p:sp>
@@ -1763,18 +1763,18 @@
           <a:bodyPr/>
           <a:lstStyle/>
           <a:p>
-            <a:fld id="{2AC86D11-95AB-4D54-A55D-3E4BE70CA48F}" type="slidenum">
-              <a:rPr lang="es-ES" smtClean="0"/>
+            <a:fld id="{282D6D79-DA7E-4C38-B43B-8F3E90E82397}" type="slidenum">
+              <a:rPr lang="en-US" smtClean="0"/>
               <a:t>‹Nº›</a:t>
             </a:fld>
-            <a:endParaRPr lang="es-ES"/>
+            <a:endParaRPr lang="en-US"/>
           </a:p>
         </p:txBody>
       </p:sp>
     </p:spTree>
     <p:extLst>
       <p:ext uri="{BB962C8B-B14F-4D97-AF65-F5344CB8AC3E}">
-        <p14:creationId xmlns:p14="http://schemas.microsoft.com/office/powerpoint/2010/main" val="2516054566"/>
+        <p14:creationId xmlns:p14="http://schemas.microsoft.com/office/powerpoint/2010/main" val="2492004053"/>
       </p:ext>
     </p:extLst>
   </p:cSld>
@@ -1816,11 +1816,11 @@
           <a:bodyPr/>
           <a:lstStyle/>
           <a:p>
-            <a:fld id="{CB7C35F1-2967-47B1-ABA0-D6ECBDD2FDCA}" type="datetimeFigureOut">
-              <a:rPr lang="es-ES" smtClean="0"/>
-              <a:t>06/08/2018</a:t>
+            <a:fld id="{87C21B04-3BFD-4195-953B-842DE72845A9}" type="datetimeFigureOut">
+              <a:rPr lang="en-US" smtClean="0"/>
+              <a:t>8/20/2018</a:t>
             </a:fld>
-            <a:endParaRPr lang="es-ES"/>
+            <a:endParaRPr lang="en-US"/>
           </a:p>
         </p:txBody>
       </p:sp>
@@ -1839,7 +1839,7 @@
           <a:bodyPr/>
           <a:lstStyle/>
           <a:p>
-            <a:endParaRPr lang="es-ES"/>
+            <a:endParaRPr lang="en-US"/>
           </a:p>
         </p:txBody>
       </p:sp>
@@ -1858,18 +1858,18 @@
           <a:bodyPr/>
           <a:lstStyle/>
           <a:p>
-            <a:fld id="{2AC86D11-95AB-4D54-A55D-3E4BE70CA48F}" type="slidenum">
-              <a:rPr lang="es-ES" smtClean="0"/>
+            <a:fld id="{282D6D79-DA7E-4C38-B43B-8F3E90E82397}" type="slidenum">
+              <a:rPr lang="en-US" smtClean="0"/>
               <a:t>‹Nº›</a:t>
             </a:fld>
-            <a:endParaRPr lang="es-ES"/>
+            <a:endParaRPr lang="en-US"/>
           </a:p>
         </p:txBody>
       </p:sp>
     </p:spTree>
     <p:extLst>
       <p:ext uri="{BB962C8B-B14F-4D97-AF65-F5344CB8AC3E}">
-        <p14:creationId xmlns:p14="http://schemas.microsoft.com/office/powerpoint/2010/main" val="1877712458"/>
+        <p14:creationId xmlns:p14="http://schemas.microsoft.com/office/powerpoint/2010/main" val="3527145557"/>
       </p:ext>
     </p:extLst>
   </p:cSld>
@@ -1924,7 +1924,7 @@
               <a:rPr lang="es-ES" smtClean="0"/>
               <a:t>Haga clic para modificar el estilo de título del patrón</a:t>
             </a:r>
-            <a:endParaRPr lang="es-ES"/>
+            <a:endParaRPr lang="en-US"/>
           </a:p>
         </p:txBody>
       </p:sp>
@@ -2009,7 +2009,7 @@
               <a:rPr lang="es-ES" smtClean="0"/>
               <a:t>Quinto nivel</a:t>
             </a:r>
-            <a:endParaRPr lang="es-ES"/>
+            <a:endParaRPr lang="en-US"/>
           </a:p>
         </p:txBody>
       </p:sp>
@@ -2093,11 +2093,11 @@
           <a:bodyPr/>
           <a:lstStyle/>
           <a:p>
-            <a:fld id="{CB7C35F1-2967-47B1-ABA0-D6ECBDD2FDCA}" type="datetimeFigureOut">
-              <a:rPr lang="es-ES" smtClean="0"/>
-              <a:t>06/08/2018</a:t>
+            <a:fld id="{87C21B04-3BFD-4195-953B-842DE72845A9}" type="datetimeFigureOut">
+              <a:rPr lang="en-US" smtClean="0"/>
+              <a:t>8/20/2018</a:t>
             </a:fld>
-            <a:endParaRPr lang="es-ES"/>
+            <a:endParaRPr lang="en-US"/>
           </a:p>
         </p:txBody>
       </p:sp>
@@ -2116,7 +2116,7 @@
           <a:bodyPr/>
           <a:lstStyle/>
           <a:p>
-            <a:endParaRPr lang="es-ES"/>
+            <a:endParaRPr lang="en-US"/>
           </a:p>
         </p:txBody>
       </p:sp>
@@ -2135,18 +2135,18 @@
           <a:bodyPr/>
           <a:lstStyle/>
           <a:p>
-            <a:fld id="{2AC86D11-95AB-4D54-A55D-3E4BE70CA48F}" type="slidenum">
-              <a:rPr lang="es-ES" smtClean="0"/>
+            <a:fld id="{282D6D79-DA7E-4C38-B43B-8F3E90E82397}" type="slidenum">
+              <a:rPr lang="en-US" smtClean="0"/>
               <a:t>‹Nº›</a:t>
             </a:fld>
-            <a:endParaRPr lang="es-ES"/>
+            <a:endParaRPr lang="en-US"/>
           </a:p>
         </p:txBody>
       </p:sp>
     </p:spTree>
     <p:extLst>
       <p:ext uri="{BB962C8B-B14F-4D97-AF65-F5344CB8AC3E}">
-        <p14:creationId xmlns:p14="http://schemas.microsoft.com/office/powerpoint/2010/main" val="2814506958"/>
+        <p14:creationId xmlns:p14="http://schemas.microsoft.com/office/powerpoint/2010/main" val="4258965092"/>
       </p:ext>
     </p:extLst>
   </p:cSld>
@@ -2201,7 +2201,7 @@
               <a:rPr lang="es-ES" smtClean="0"/>
               <a:t>Haga clic para modificar el estilo de título del patrón</a:t>
             </a:r>
-            <a:endParaRPr lang="es-ES"/>
+            <a:endParaRPr lang="en-US"/>
           </a:p>
         </p:txBody>
       </p:sp>
@@ -2262,7 +2262,7 @@
             </a:lvl9pPr>
           </a:lstStyle>
           <a:p>
-            <a:endParaRPr lang="es-ES"/>
+            <a:endParaRPr lang="en-US"/>
           </a:p>
         </p:txBody>
       </p:sp>
@@ -2346,11 +2346,11 @@
           <a:bodyPr/>
           <a:lstStyle/>
           <a:p>
-            <a:fld id="{CB7C35F1-2967-47B1-ABA0-D6ECBDD2FDCA}" type="datetimeFigureOut">
-              <a:rPr lang="es-ES" smtClean="0"/>
-              <a:t>06/08/2018</a:t>
+            <a:fld id="{87C21B04-3BFD-4195-953B-842DE72845A9}" type="datetimeFigureOut">
+              <a:rPr lang="en-US" smtClean="0"/>
+              <a:t>8/20/2018</a:t>
             </a:fld>
-            <a:endParaRPr lang="es-ES"/>
+            <a:endParaRPr lang="en-US"/>
           </a:p>
         </p:txBody>
       </p:sp>
@@ -2369,7 +2369,7 @@
           <a:bodyPr/>
           <a:lstStyle/>
           <a:p>
-            <a:endParaRPr lang="es-ES"/>
+            <a:endParaRPr lang="en-US"/>
           </a:p>
         </p:txBody>
       </p:sp>
@@ -2388,18 +2388,18 @@
           <a:bodyPr/>
           <a:lstStyle/>
           <a:p>
-            <a:fld id="{2AC86D11-95AB-4D54-A55D-3E4BE70CA48F}" type="slidenum">
-              <a:rPr lang="es-ES" smtClean="0"/>
+            <a:fld id="{282D6D79-DA7E-4C38-B43B-8F3E90E82397}" type="slidenum">
+              <a:rPr lang="en-US" smtClean="0"/>
               <a:t>‹Nº›</a:t>
             </a:fld>
-            <a:endParaRPr lang="es-ES"/>
+            <a:endParaRPr lang="en-US"/>
           </a:p>
         </p:txBody>
       </p:sp>
     </p:spTree>
     <p:extLst>
       <p:ext uri="{BB962C8B-B14F-4D97-AF65-F5344CB8AC3E}">
-        <p14:creationId xmlns:p14="http://schemas.microsoft.com/office/powerpoint/2010/main" val="2857179246"/>
+        <p14:creationId xmlns:p14="http://schemas.microsoft.com/office/powerpoint/2010/main" val="875962881"/>
       </p:ext>
     </p:extLst>
   </p:cSld>
@@ -2460,7 +2460,7 @@
               <a:rPr lang="es-ES" smtClean="0"/>
               <a:t>Haga clic para modificar el estilo de título del patrón</a:t>
             </a:r>
-            <a:endParaRPr lang="es-ES"/>
+            <a:endParaRPr lang="en-US"/>
           </a:p>
         </p:txBody>
       </p:sp>
@@ -2522,7 +2522,7 @@
               <a:rPr lang="es-ES" smtClean="0"/>
               <a:t>Quinto nivel</a:t>
             </a:r>
-            <a:endParaRPr lang="es-ES"/>
+            <a:endParaRPr lang="en-US"/>
           </a:p>
         </p:txBody>
       </p:sp>
@@ -2559,11 +2559,11 @@
             </a:lvl1pPr>
           </a:lstStyle>
           <a:p>
-            <a:fld id="{CB7C35F1-2967-47B1-ABA0-D6ECBDD2FDCA}" type="datetimeFigureOut">
-              <a:rPr lang="es-ES" smtClean="0"/>
-              <a:t>06/08/2018</a:t>
+            <a:fld id="{87C21B04-3BFD-4195-953B-842DE72845A9}" type="datetimeFigureOut">
+              <a:rPr lang="en-US" smtClean="0"/>
+              <a:t>8/20/2018</a:t>
             </a:fld>
-            <a:endParaRPr lang="es-ES"/>
+            <a:endParaRPr lang="en-US"/>
           </a:p>
         </p:txBody>
       </p:sp>
@@ -2600,7 +2600,7 @@
             </a:lvl1pPr>
           </a:lstStyle>
           <a:p>
-            <a:endParaRPr lang="es-ES"/>
+            <a:endParaRPr lang="en-US"/>
           </a:p>
         </p:txBody>
       </p:sp>
@@ -2637,18 +2637,18 @@
             </a:lvl1pPr>
           </a:lstStyle>
           <a:p>
-            <a:fld id="{2AC86D11-95AB-4D54-A55D-3E4BE70CA48F}" type="slidenum">
-              <a:rPr lang="es-ES" smtClean="0"/>
+            <a:fld id="{282D6D79-DA7E-4C38-B43B-8F3E90E82397}" type="slidenum">
+              <a:rPr lang="en-US" smtClean="0"/>
               <a:t>‹Nº›</a:t>
             </a:fld>
-            <a:endParaRPr lang="es-ES"/>
+            <a:endParaRPr lang="en-US"/>
           </a:p>
         </p:txBody>
       </p:sp>
     </p:spTree>
     <p:extLst>
       <p:ext uri="{BB962C8B-B14F-4D97-AF65-F5344CB8AC3E}">
-        <p14:creationId xmlns:p14="http://schemas.microsoft.com/office/powerpoint/2010/main" val="464177610"/>
+        <p14:creationId xmlns:p14="http://schemas.microsoft.com/office/powerpoint/2010/main" val="920138128"/>
       </p:ext>
     </p:extLst>
   </p:cSld>
@@ -2852,7 +2852,7 @@
     </p:bodyStyle>
     <p:otherStyle>
       <a:defPPr>
-        <a:defRPr lang="es-ES"/>
+        <a:defRPr lang="en-US"/>
       </a:defPPr>
       <a:lvl1pPr marL="0" algn="l" defTabSz="914400" rtl="0" eaLnBrk="1" latinLnBrk="0" hangingPunct="1">
         <a:defRPr sz="1800" kern="1200">
@@ -2952,184 +2952,6 @@
 <file path=ppt/slides/slide1.xml><?xml version="1.0" encoding="utf-8"?>
 <p:sld xmlns:a="http://schemas.openxmlformats.org/drawingml/2006/main" xmlns:r="http://schemas.openxmlformats.org/officeDocument/2006/relationships" xmlns:p="http://schemas.openxmlformats.org/presentationml/2006/main">
   <p:cSld>
-    <p:bg>
-      <p:bgPr>
-        <a:solidFill>
-          <a:schemeClr val="bg2">
-            <a:lumMod val="75000"/>
-          </a:schemeClr>
-        </a:solidFill>
-        <a:effectLst/>
-      </p:bgPr>
-    </p:bg>
-    <p:spTree>
-      <p:nvGrpSpPr>
-        <p:cNvPr id="1" name=""/>
-        <p:cNvGrpSpPr/>
-        <p:nvPr/>
-      </p:nvGrpSpPr>
-      <p:grpSpPr>
-        <a:xfrm>
-          <a:off x="0" y="0"/>
-          <a:ext cx="0" cy="0"/>
-          <a:chOff x="0" y="0"/>
-          <a:chExt cx="0" cy="0"/>
-        </a:xfrm>
-      </p:grpSpPr>
-      <p:sp>
-        <p:nvSpPr>
-          <p:cNvPr id="2" name="Título 1"/>
-          <p:cNvSpPr>
-            <a:spLocks noGrp="1"/>
-          </p:cNvSpPr>
-          <p:nvPr>
-            <p:ph type="ctrTitle"/>
-          </p:nvPr>
-        </p:nvSpPr>
-        <p:spPr/>
-        <p:txBody>
-          <a:bodyPr/>
-          <a:lstStyle/>
-          <a:p>
-            <a:endParaRPr lang="es-ES" dirty="0"/>
-          </a:p>
-        </p:txBody>
-      </p:sp>
-      <p:sp>
-        <p:nvSpPr>
-          <p:cNvPr id="3" name="Subtítulo 2"/>
-          <p:cNvSpPr>
-            <a:spLocks noGrp="1"/>
-          </p:cNvSpPr>
-          <p:nvPr>
-            <p:ph type="subTitle" idx="1"/>
-          </p:nvPr>
-        </p:nvSpPr>
-        <p:spPr/>
-        <p:txBody>
-          <a:bodyPr/>
-          <a:lstStyle/>
-          <a:p>
-            <a:endParaRPr lang="es-ES"/>
-          </a:p>
-        </p:txBody>
-      </p:sp>
-      <p:pic>
-        <p:nvPicPr>
-          <p:cNvPr id="4" name="Imagen 3"/>
-          <p:cNvPicPr>
-            <a:picLocks noChangeAspect="1"/>
-          </p:cNvPicPr>
-          <p:nvPr/>
-        </p:nvPicPr>
-        <p:blipFill>
-          <a:blip r:embed="rId2">
-            <a:extLst>
-              <a:ext uri="{28A0092B-C50C-407E-A947-70E740481C1C}">
-                <a14:useLocalDpi xmlns:a14="http://schemas.microsoft.com/office/drawing/2010/main" val="0"/>
-              </a:ext>
-            </a:extLst>
-          </a:blip>
-          <a:stretch>
-            <a:fillRect/>
-          </a:stretch>
-        </p:blipFill>
-        <p:spPr>
-          <a:xfrm>
-            <a:off x="620202" y="540689"/>
-            <a:ext cx="3658901" cy="5603143"/>
-          </a:xfrm>
-          <a:prstGeom prst="rect">
-            <a:avLst/>
-          </a:prstGeom>
-        </p:spPr>
-      </p:pic>
-      <p:pic>
-        <p:nvPicPr>
-          <p:cNvPr id="5" name="Imagen 4"/>
-          <p:cNvPicPr>
-            <a:picLocks noChangeAspect="1"/>
-          </p:cNvPicPr>
-          <p:nvPr/>
-        </p:nvPicPr>
-        <p:blipFill>
-          <a:blip r:embed="rId3">
-            <a:extLst>
-              <a:ext uri="{28A0092B-C50C-407E-A947-70E740481C1C}">
-                <a14:useLocalDpi xmlns:a14="http://schemas.microsoft.com/office/drawing/2010/main" val="0"/>
-              </a:ext>
-            </a:extLst>
-          </a:blip>
-          <a:stretch>
-            <a:fillRect/>
-          </a:stretch>
-        </p:blipFill>
-        <p:spPr>
-          <a:xfrm>
-            <a:off x="8024689" y="540689"/>
-            <a:ext cx="3441092" cy="5603143"/>
-          </a:xfrm>
-          <a:prstGeom prst="rect">
-            <a:avLst/>
-          </a:prstGeom>
-        </p:spPr>
-      </p:pic>
-      <p:pic>
-        <p:nvPicPr>
-          <p:cNvPr id="6" name="Imagen 5"/>
-          <p:cNvPicPr>
-            <a:picLocks noChangeAspect="1"/>
-          </p:cNvPicPr>
-          <p:nvPr/>
-        </p:nvPicPr>
-        <p:blipFill>
-          <a:blip r:embed="rId4" cstate="print">
-            <a:extLst>
-              <a:ext uri="{28A0092B-C50C-407E-A947-70E740481C1C}">
-                <a14:useLocalDpi xmlns:a14="http://schemas.microsoft.com/office/drawing/2010/main" val="0"/>
-              </a:ext>
-            </a:extLst>
-          </a:blip>
-          <a:stretch>
-            <a:fillRect/>
-          </a:stretch>
-        </p:blipFill>
-        <p:spPr>
-          <a:xfrm rot="5400000">
-            <a:off x="3335917" y="1657505"/>
-            <a:ext cx="5620885" cy="3387259"/>
-          </a:xfrm>
-          <a:prstGeom prst="rect">
-            <a:avLst/>
-          </a:prstGeom>
-        </p:spPr>
-      </p:pic>
-    </p:spTree>
-    <p:extLst>
-      <p:ext uri="{BB962C8B-B14F-4D97-AF65-F5344CB8AC3E}">
-        <p14:creationId xmlns:p14="http://schemas.microsoft.com/office/powerpoint/2010/main" val="1181332899"/>
-      </p:ext>
-    </p:extLst>
-  </p:cSld>
-  <p:clrMapOvr>
-    <a:masterClrMapping/>
-  </p:clrMapOvr>
-</p:sld>
-</file>
-
-<file path=ppt/slides/slide2.xml><?xml version="1.0" encoding="utf-8"?>
-<p:sld xmlns:a="http://schemas.openxmlformats.org/drawingml/2006/main" xmlns:r="http://schemas.openxmlformats.org/officeDocument/2006/relationships" xmlns:p="http://schemas.openxmlformats.org/presentationml/2006/main">
-  <p:cSld>
-    <p:bg>
-      <p:bgPr>
-        <a:solidFill>
-          <a:schemeClr val="bg2">
-            <a:lumMod val="75000"/>
-          </a:schemeClr>
-        </a:solidFill>
-        <a:effectLst/>
-      </p:bgPr>
-    </p:bg>
     <p:spTree>
       <p:nvGrpSpPr>
         <p:cNvPr id="1" name=""/>
@@ -3146,38 +2968,44 @@
       </p:grpSpPr>
       <p:pic>
         <p:nvPicPr>
-          <p:cNvPr id="5" name="Imagen 4"/>
+          <p:cNvPr id="7" name="Imagen 6"/>
           <p:cNvPicPr>
             <a:picLocks noChangeAspect="1"/>
           </p:cNvPicPr>
           <p:nvPr/>
         </p:nvPicPr>
         <p:blipFill>
-          <a:blip r:embed="rId2">
-            <a:extLst>
-              <a:ext uri="{28A0092B-C50C-407E-A947-70E740481C1C}">
-                <a14:useLocalDpi xmlns:a14="http://schemas.microsoft.com/office/drawing/2010/main" val="0"/>
-              </a:ext>
-            </a:extLst>
-          </a:blip>
+          <a:blip r:embed="rId2"/>
           <a:stretch>
             <a:fillRect/>
           </a:stretch>
         </p:blipFill>
         <p:spPr>
           <a:xfrm>
-            <a:off x="1376624" y="341643"/>
-            <a:ext cx="9766997" cy="6129495"/>
+            <a:off x="1581150" y="414337"/>
+            <a:ext cx="9029700" cy="6029325"/>
           </a:xfrm>
           <a:prstGeom prst="rect">
             <a:avLst/>
           </a:prstGeom>
+          <a:ln w="228600" cap="sq" cmpd="thickThin">
+            <a:solidFill>
+              <a:srgbClr val="7030A0"/>
+            </a:solidFill>
+            <a:prstDash val="solid"/>
+            <a:miter lim="800000"/>
+          </a:ln>
+          <a:effectLst>
+            <a:innerShdw blurRad="76200">
+              <a:srgbClr val="000000"/>
+            </a:innerShdw>
+          </a:effectLst>
         </p:spPr>
       </p:pic>
     </p:spTree>
     <p:extLst>
       <p:ext uri="{BB962C8B-B14F-4D97-AF65-F5344CB8AC3E}">
-        <p14:creationId xmlns:p14="http://schemas.microsoft.com/office/powerpoint/2010/main" val="2755777187"/>
+        <p14:creationId xmlns:p14="http://schemas.microsoft.com/office/powerpoint/2010/main" val="1098800373"/>
       </p:ext>
     </p:extLst>
   </p:cSld>
@@ -3187,19 +3015,9 @@
 </p:sld>
 </file>
 
-<file path=ppt/slides/slide3.xml><?xml version="1.0" encoding="utf-8"?>
+<file path=ppt/slides/slide2.xml><?xml version="1.0" encoding="utf-8"?>
 <p:sld xmlns:a="http://schemas.openxmlformats.org/drawingml/2006/main" xmlns:r="http://schemas.openxmlformats.org/officeDocument/2006/relationships" xmlns:p="http://schemas.openxmlformats.org/presentationml/2006/main">
   <p:cSld>
-    <p:bg>
-      <p:bgPr>
-        <a:solidFill>
-          <a:schemeClr val="bg2">
-            <a:lumMod val="75000"/>
-          </a:schemeClr>
-        </a:solidFill>
-        <a:effectLst/>
-      </p:bgPr>
-    </p:bg>
     <p:spTree>
       <p:nvGrpSpPr>
         <p:cNvPr id="1" name=""/>
@@ -3216,37 +3034,110 @@
       </p:grpSpPr>
       <p:pic>
         <p:nvPicPr>
-          <p:cNvPr id="4" name="Marcador de contenido 3"/>
+          <p:cNvPr id="4" name="Imagen 3"/>
           <p:cNvPicPr>
-            <a:picLocks noGrp="1" noChangeAspect="1"/>
+            <a:picLocks noChangeAspect="1"/>
           </p:cNvPicPr>
-          <p:nvPr>
-            <p:ph idx="1"/>
-          </p:nvPr>
+          <p:nvPr/>
         </p:nvPicPr>
         <p:blipFill>
-          <a:blip r:embed="rId2">
-            <a:extLst>
-              <a:ext uri="{28A0092B-C50C-407E-A947-70E740481C1C}">
-                <a14:useLocalDpi xmlns:a14="http://schemas.microsoft.com/office/drawing/2010/main" val="0"/>
-              </a:ext>
-            </a:extLst>
-          </a:blip>
+          <a:blip r:embed="rId2"/>
           <a:stretch>
             <a:fillRect/>
           </a:stretch>
         </p:blipFill>
         <p:spPr>
           <a:xfrm>
-            <a:off x="1564194" y="365125"/>
-            <a:ext cx="9063612" cy="6072179"/>
+            <a:off x="1214437" y="376237"/>
+            <a:ext cx="9763125" cy="6105525"/>
           </a:xfrm>
+          <a:prstGeom prst="rect">
+            <a:avLst/>
+          </a:prstGeom>
+          <a:ln w="228600" cap="sq" cmpd="thickThin">
+            <a:solidFill>
+              <a:srgbClr val="7030A0"/>
+            </a:solidFill>
+            <a:prstDash val="solid"/>
+            <a:miter lim="800000"/>
+          </a:ln>
+          <a:effectLst>
+            <a:innerShdw blurRad="76200">
+              <a:srgbClr val="000000"/>
+            </a:innerShdw>
+          </a:effectLst>
         </p:spPr>
       </p:pic>
     </p:spTree>
     <p:extLst>
       <p:ext uri="{BB962C8B-B14F-4D97-AF65-F5344CB8AC3E}">
-        <p14:creationId xmlns:p14="http://schemas.microsoft.com/office/powerpoint/2010/main" val="1199086444"/>
+        <p14:creationId xmlns:p14="http://schemas.microsoft.com/office/powerpoint/2010/main" val="3053501745"/>
+      </p:ext>
+    </p:extLst>
+  </p:cSld>
+  <p:clrMapOvr>
+    <a:masterClrMapping/>
+  </p:clrMapOvr>
+</p:sld>
+</file>
+
+<file path=ppt/slides/slide3.xml><?xml version="1.0" encoding="utf-8"?>
+<p:sld xmlns:a="http://schemas.openxmlformats.org/drawingml/2006/main" xmlns:r="http://schemas.openxmlformats.org/officeDocument/2006/relationships" xmlns:p="http://schemas.openxmlformats.org/presentationml/2006/main">
+  <p:cSld>
+    <p:spTree>
+      <p:nvGrpSpPr>
+        <p:cNvPr id="1" name=""/>
+        <p:cNvGrpSpPr/>
+        <p:nvPr/>
+      </p:nvGrpSpPr>
+      <p:grpSpPr>
+        <a:xfrm>
+          <a:off x="0" y="0"/>
+          <a:ext cx="0" cy="0"/>
+          <a:chOff x="0" y="0"/>
+          <a:chExt cx="0" cy="0"/>
+        </a:xfrm>
+      </p:grpSpPr>
+      <p:pic>
+        <p:nvPicPr>
+          <p:cNvPr id="4" name="Imagen 3"/>
+          <p:cNvPicPr>
+            <a:picLocks noChangeAspect="1"/>
+          </p:cNvPicPr>
+          <p:nvPr/>
+        </p:nvPicPr>
+        <p:blipFill>
+          <a:blip r:embed="rId2"/>
+          <a:stretch>
+            <a:fillRect/>
+          </a:stretch>
+        </p:blipFill>
+        <p:spPr>
+          <a:xfrm>
+            <a:off x="1174079" y="392781"/>
+            <a:ext cx="10313572" cy="5494672"/>
+          </a:xfrm>
+          <a:prstGeom prst="rect">
+            <a:avLst/>
+          </a:prstGeom>
+          <a:ln w="228600" cap="sq" cmpd="thickThin">
+            <a:solidFill>
+              <a:srgbClr val="7030A0"/>
+            </a:solidFill>
+            <a:prstDash val="solid"/>
+            <a:miter lim="800000"/>
+          </a:ln>
+          <a:effectLst>
+            <a:innerShdw blurRad="76200">
+              <a:srgbClr val="000000"/>
+            </a:innerShdw>
+          </a:effectLst>
+        </p:spPr>
+      </p:pic>
+    </p:spTree>
+    <p:extLst>
+      <p:ext uri="{BB962C8B-B14F-4D97-AF65-F5344CB8AC3E}">
+        <p14:creationId xmlns:p14="http://schemas.microsoft.com/office/powerpoint/2010/main" val="1582955174"/>
       </p:ext>
     </p:extLst>
   </p:cSld>

</xml_diff>

<commit_message>
Revert "actualizacion por Katherine Williams"
This reverts commit 9e7cb5b0da2a9ae58101969d862178071fb86ec9.
</commit_message>
<xml_diff>
--- a/img/carrusel/Presentación1.pptx
+++ b/img/carrusel/Presentación1.pptx
@@ -6,14 +6,14 @@
   </p:sldMasterIdLst>
   <p:sldIdLst>
     <p:sldId id="256" r:id="rId2"/>
-    <p:sldId id="258" r:id="rId3"/>
-    <p:sldId id="257" r:id="rId4"/>
+    <p:sldId id="257" r:id="rId3"/>
+    <p:sldId id="258" r:id="rId4"/>
   </p:sldIdLst>
   <p:sldSz cx="12192000" cy="6858000"/>
   <p:notesSz cx="6858000" cy="9144000"/>
   <p:defaultTextStyle>
     <a:defPPr>
-      <a:defRPr lang="en-US"/>
+      <a:defRPr lang="es-ES"/>
     </a:defPPr>
     <a:lvl1pPr marL="0" algn="l" defTabSz="914400" rtl="0" eaLnBrk="1" latinLnBrk="0" hangingPunct="1">
       <a:defRPr sz="1800" kern="1200">
@@ -154,7 +154,7 @@
               <a:rPr lang="es-ES" smtClean="0"/>
               <a:t>Haga clic para modificar el estilo de título del patrón</a:t>
             </a:r>
-            <a:endParaRPr lang="en-US"/>
+            <a:endParaRPr lang="es-ES"/>
           </a:p>
         </p:txBody>
       </p:sp>
@@ -219,7 +219,7 @@
               <a:rPr lang="es-ES" smtClean="0"/>
               <a:t>Haga clic para modificar el estilo de subtítulo del patrón</a:t>
             </a:r>
-            <a:endParaRPr lang="en-US"/>
+            <a:endParaRPr lang="es-ES"/>
           </a:p>
         </p:txBody>
       </p:sp>
@@ -238,11 +238,11 @@
           <a:bodyPr/>
           <a:lstStyle/>
           <a:p>
-            <a:fld id="{87C21B04-3BFD-4195-953B-842DE72845A9}" type="datetimeFigureOut">
-              <a:rPr lang="en-US" smtClean="0"/>
-              <a:t>8/20/2018</a:t>
+            <a:fld id="{CB7C35F1-2967-47B1-ABA0-D6ECBDD2FDCA}" type="datetimeFigureOut">
+              <a:rPr lang="es-ES" smtClean="0"/>
+              <a:t>06/08/2018</a:t>
             </a:fld>
-            <a:endParaRPr lang="en-US"/>
+            <a:endParaRPr lang="es-ES"/>
           </a:p>
         </p:txBody>
       </p:sp>
@@ -261,7 +261,7 @@
           <a:bodyPr/>
           <a:lstStyle/>
           <a:p>
-            <a:endParaRPr lang="en-US"/>
+            <a:endParaRPr lang="es-ES"/>
           </a:p>
         </p:txBody>
       </p:sp>
@@ -280,18 +280,18 @@
           <a:bodyPr/>
           <a:lstStyle/>
           <a:p>
-            <a:fld id="{282D6D79-DA7E-4C38-B43B-8F3E90E82397}" type="slidenum">
-              <a:rPr lang="en-US" smtClean="0"/>
+            <a:fld id="{2AC86D11-95AB-4D54-A55D-3E4BE70CA48F}" type="slidenum">
+              <a:rPr lang="es-ES" smtClean="0"/>
               <a:t>‹Nº›</a:t>
             </a:fld>
-            <a:endParaRPr lang="en-US"/>
+            <a:endParaRPr lang="es-ES"/>
           </a:p>
         </p:txBody>
       </p:sp>
     </p:spTree>
     <p:extLst>
       <p:ext uri="{BB962C8B-B14F-4D97-AF65-F5344CB8AC3E}">
-        <p14:creationId xmlns:p14="http://schemas.microsoft.com/office/powerpoint/2010/main" val="4138249826"/>
+        <p14:creationId xmlns:p14="http://schemas.microsoft.com/office/powerpoint/2010/main" val="651000721"/>
       </p:ext>
     </p:extLst>
   </p:cSld>
@@ -337,7 +337,7 @@
               <a:rPr lang="es-ES" smtClean="0"/>
               <a:t>Haga clic para modificar el estilo de título del patrón</a:t>
             </a:r>
-            <a:endParaRPr lang="en-US"/>
+            <a:endParaRPr lang="es-ES"/>
           </a:p>
         </p:txBody>
       </p:sp>
@@ -389,7 +389,7 @@
               <a:rPr lang="es-ES" smtClean="0"/>
               <a:t>Quinto nivel</a:t>
             </a:r>
-            <a:endParaRPr lang="en-US"/>
+            <a:endParaRPr lang="es-ES"/>
           </a:p>
         </p:txBody>
       </p:sp>
@@ -408,11 +408,11 @@
           <a:bodyPr/>
           <a:lstStyle/>
           <a:p>
-            <a:fld id="{87C21B04-3BFD-4195-953B-842DE72845A9}" type="datetimeFigureOut">
-              <a:rPr lang="en-US" smtClean="0"/>
-              <a:t>8/20/2018</a:t>
+            <a:fld id="{CB7C35F1-2967-47B1-ABA0-D6ECBDD2FDCA}" type="datetimeFigureOut">
+              <a:rPr lang="es-ES" smtClean="0"/>
+              <a:t>06/08/2018</a:t>
             </a:fld>
-            <a:endParaRPr lang="en-US"/>
+            <a:endParaRPr lang="es-ES"/>
           </a:p>
         </p:txBody>
       </p:sp>
@@ -431,7 +431,7 @@
           <a:bodyPr/>
           <a:lstStyle/>
           <a:p>
-            <a:endParaRPr lang="en-US"/>
+            <a:endParaRPr lang="es-ES"/>
           </a:p>
         </p:txBody>
       </p:sp>
@@ -450,18 +450,18 @@
           <a:bodyPr/>
           <a:lstStyle/>
           <a:p>
-            <a:fld id="{282D6D79-DA7E-4C38-B43B-8F3E90E82397}" type="slidenum">
-              <a:rPr lang="en-US" smtClean="0"/>
+            <a:fld id="{2AC86D11-95AB-4D54-A55D-3E4BE70CA48F}" type="slidenum">
+              <a:rPr lang="es-ES" smtClean="0"/>
               <a:t>‹Nº›</a:t>
             </a:fld>
-            <a:endParaRPr lang="en-US"/>
+            <a:endParaRPr lang="es-ES"/>
           </a:p>
         </p:txBody>
       </p:sp>
     </p:spTree>
     <p:extLst>
       <p:ext uri="{BB962C8B-B14F-4D97-AF65-F5344CB8AC3E}">
-        <p14:creationId xmlns:p14="http://schemas.microsoft.com/office/powerpoint/2010/main" val="3090923053"/>
+        <p14:creationId xmlns:p14="http://schemas.microsoft.com/office/powerpoint/2010/main" val="4272878317"/>
       </p:ext>
     </p:extLst>
   </p:cSld>
@@ -512,7 +512,7 @@
               <a:rPr lang="es-ES" smtClean="0"/>
               <a:t>Haga clic para modificar el estilo de título del patrón</a:t>
             </a:r>
-            <a:endParaRPr lang="en-US"/>
+            <a:endParaRPr lang="es-ES"/>
           </a:p>
         </p:txBody>
       </p:sp>
@@ -569,7 +569,7 @@
               <a:rPr lang="es-ES" smtClean="0"/>
               <a:t>Quinto nivel</a:t>
             </a:r>
-            <a:endParaRPr lang="en-US"/>
+            <a:endParaRPr lang="es-ES"/>
           </a:p>
         </p:txBody>
       </p:sp>
@@ -588,11 +588,11 @@
           <a:bodyPr/>
           <a:lstStyle/>
           <a:p>
-            <a:fld id="{87C21B04-3BFD-4195-953B-842DE72845A9}" type="datetimeFigureOut">
-              <a:rPr lang="en-US" smtClean="0"/>
-              <a:t>8/20/2018</a:t>
+            <a:fld id="{CB7C35F1-2967-47B1-ABA0-D6ECBDD2FDCA}" type="datetimeFigureOut">
+              <a:rPr lang="es-ES" smtClean="0"/>
+              <a:t>06/08/2018</a:t>
             </a:fld>
-            <a:endParaRPr lang="en-US"/>
+            <a:endParaRPr lang="es-ES"/>
           </a:p>
         </p:txBody>
       </p:sp>
@@ -611,7 +611,7 @@
           <a:bodyPr/>
           <a:lstStyle/>
           <a:p>
-            <a:endParaRPr lang="en-US"/>
+            <a:endParaRPr lang="es-ES"/>
           </a:p>
         </p:txBody>
       </p:sp>
@@ -630,18 +630,18 @@
           <a:bodyPr/>
           <a:lstStyle/>
           <a:p>
-            <a:fld id="{282D6D79-DA7E-4C38-B43B-8F3E90E82397}" type="slidenum">
-              <a:rPr lang="en-US" smtClean="0"/>
+            <a:fld id="{2AC86D11-95AB-4D54-A55D-3E4BE70CA48F}" type="slidenum">
+              <a:rPr lang="es-ES" smtClean="0"/>
               <a:t>‹Nº›</a:t>
             </a:fld>
-            <a:endParaRPr lang="en-US"/>
+            <a:endParaRPr lang="es-ES"/>
           </a:p>
         </p:txBody>
       </p:sp>
     </p:spTree>
     <p:extLst>
       <p:ext uri="{BB962C8B-B14F-4D97-AF65-F5344CB8AC3E}">
-        <p14:creationId xmlns:p14="http://schemas.microsoft.com/office/powerpoint/2010/main" val="4173914836"/>
+        <p14:creationId xmlns:p14="http://schemas.microsoft.com/office/powerpoint/2010/main" val="1394968067"/>
       </p:ext>
     </p:extLst>
   </p:cSld>
@@ -687,7 +687,7 @@
               <a:rPr lang="es-ES" smtClean="0"/>
               <a:t>Haga clic para modificar el estilo de título del patrón</a:t>
             </a:r>
-            <a:endParaRPr lang="en-US"/>
+            <a:endParaRPr lang="es-ES"/>
           </a:p>
         </p:txBody>
       </p:sp>
@@ -739,7 +739,7 @@
               <a:rPr lang="es-ES" smtClean="0"/>
               <a:t>Quinto nivel</a:t>
             </a:r>
-            <a:endParaRPr lang="en-US"/>
+            <a:endParaRPr lang="es-ES"/>
           </a:p>
         </p:txBody>
       </p:sp>
@@ -758,11 +758,11 @@
           <a:bodyPr/>
           <a:lstStyle/>
           <a:p>
-            <a:fld id="{87C21B04-3BFD-4195-953B-842DE72845A9}" type="datetimeFigureOut">
-              <a:rPr lang="en-US" smtClean="0"/>
-              <a:t>8/20/2018</a:t>
+            <a:fld id="{CB7C35F1-2967-47B1-ABA0-D6ECBDD2FDCA}" type="datetimeFigureOut">
+              <a:rPr lang="es-ES" smtClean="0"/>
+              <a:t>06/08/2018</a:t>
             </a:fld>
-            <a:endParaRPr lang="en-US"/>
+            <a:endParaRPr lang="es-ES"/>
           </a:p>
         </p:txBody>
       </p:sp>
@@ -781,7 +781,7 @@
           <a:bodyPr/>
           <a:lstStyle/>
           <a:p>
-            <a:endParaRPr lang="en-US"/>
+            <a:endParaRPr lang="es-ES"/>
           </a:p>
         </p:txBody>
       </p:sp>
@@ -800,18 +800,18 @@
           <a:bodyPr/>
           <a:lstStyle/>
           <a:p>
-            <a:fld id="{282D6D79-DA7E-4C38-B43B-8F3E90E82397}" type="slidenum">
-              <a:rPr lang="en-US" smtClean="0"/>
+            <a:fld id="{2AC86D11-95AB-4D54-A55D-3E4BE70CA48F}" type="slidenum">
+              <a:rPr lang="es-ES" smtClean="0"/>
               <a:t>‹Nº›</a:t>
             </a:fld>
-            <a:endParaRPr lang="en-US"/>
+            <a:endParaRPr lang="es-ES"/>
           </a:p>
         </p:txBody>
       </p:sp>
     </p:spTree>
     <p:extLst>
       <p:ext uri="{BB962C8B-B14F-4D97-AF65-F5344CB8AC3E}">
-        <p14:creationId xmlns:p14="http://schemas.microsoft.com/office/powerpoint/2010/main" val="2085084184"/>
+        <p14:creationId xmlns:p14="http://schemas.microsoft.com/office/powerpoint/2010/main" val="673281061"/>
       </p:ext>
     </p:extLst>
   </p:cSld>
@@ -866,7 +866,7 @@
               <a:rPr lang="es-ES" smtClean="0"/>
               <a:t>Haga clic para modificar el estilo de título del patrón</a:t>
             </a:r>
-            <a:endParaRPr lang="en-US"/>
+            <a:endParaRPr lang="es-ES"/>
           </a:p>
         </p:txBody>
       </p:sp>
@@ -1004,11 +1004,11 @@
           <a:bodyPr/>
           <a:lstStyle/>
           <a:p>
-            <a:fld id="{87C21B04-3BFD-4195-953B-842DE72845A9}" type="datetimeFigureOut">
-              <a:rPr lang="en-US" smtClean="0"/>
-              <a:t>8/20/2018</a:t>
+            <a:fld id="{CB7C35F1-2967-47B1-ABA0-D6ECBDD2FDCA}" type="datetimeFigureOut">
+              <a:rPr lang="es-ES" smtClean="0"/>
+              <a:t>06/08/2018</a:t>
             </a:fld>
-            <a:endParaRPr lang="en-US"/>
+            <a:endParaRPr lang="es-ES"/>
           </a:p>
         </p:txBody>
       </p:sp>
@@ -1027,7 +1027,7 @@
           <a:bodyPr/>
           <a:lstStyle/>
           <a:p>
-            <a:endParaRPr lang="en-US"/>
+            <a:endParaRPr lang="es-ES"/>
           </a:p>
         </p:txBody>
       </p:sp>
@@ -1046,18 +1046,18 @@
           <a:bodyPr/>
           <a:lstStyle/>
           <a:p>
-            <a:fld id="{282D6D79-DA7E-4C38-B43B-8F3E90E82397}" type="slidenum">
-              <a:rPr lang="en-US" smtClean="0"/>
+            <a:fld id="{2AC86D11-95AB-4D54-A55D-3E4BE70CA48F}" type="slidenum">
+              <a:rPr lang="es-ES" smtClean="0"/>
               <a:t>‹Nº›</a:t>
             </a:fld>
-            <a:endParaRPr lang="en-US"/>
+            <a:endParaRPr lang="es-ES"/>
           </a:p>
         </p:txBody>
       </p:sp>
     </p:spTree>
     <p:extLst>
       <p:ext uri="{BB962C8B-B14F-4D97-AF65-F5344CB8AC3E}">
-        <p14:creationId xmlns:p14="http://schemas.microsoft.com/office/powerpoint/2010/main" val="2511605569"/>
+        <p14:creationId xmlns:p14="http://schemas.microsoft.com/office/powerpoint/2010/main" val="793594111"/>
       </p:ext>
     </p:extLst>
   </p:cSld>
@@ -1103,7 +1103,7 @@
               <a:rPr lang="es-ES" smtClean="0"/>
               <a:t>Haga clic para modificar el estilo de título del patrón</a:t>
             </a:r>
-            <a:endParaRPr lang="en-US"/>
+            <a:endParaRPr lang="es-ES"/>
           </a:p>
         </p:txBody>
       </p:sp>
@@ -1160,7 +1160,7 @@
               <a:rPr lang="es-ES" smtClean="0"/>
               <a:t>Quinto nivel</a:t>
             </a:r>
-            <a:endParaRPr lang="en-US"/>
+            <a:endParaRPr lang="es-ES"/>
           </a:p>
         </p:txBody>
       </p:sp>
@@ -1217,7 +1217,7 @@
               <a:rPr lang="es-ES" smtClean="0"/>
               <a:t>Quinto nivel</a:t>
             </a:r>
-            <a:endParaRPr lang="en-US"/>
+            <a:endParaRPr lang="es-ES"/>
           </a:p>
         </p:txBody>
       </p:sp>
@@ -1236,11 +1236,11 @@
           <a:bodyPr/>
           <a:lstStyle/>
           <a:p>
-            <a:fld id="{87C21B04-3BFD-4195-953B-842DE72845A9}" type="datetimeFigureOut">
-              <a:rPr lang="en-US" smtClean="0"/>
-              <a:t>8/20/2018</a:t>
+            <a:fld id="{CB7C35F1-2967-47B1-ABA0-D6ECBDD2FDCA}" type="datetimeFigureOut">
+              <a:rPr lang="es-ES" smtClean="0"/>
+              <a:t>06/08/2018</a:t>
             </a:fld>
-            <a:endParaRPr lang="en-US"/>
+            <a:endParaRPr lang="es-ES"/>
           </a:p>
         </p:txBody>
       </p:sp>
@@ -1259,7 +1259,7 @@
           <a:bodyPr/>
           <a:lstStyle/>
           <a:p>
-            <a:endParaRPr lang="en-US"/>
+            <a:endParaRPr lang="es-ES"/>
           </a:p>
         </p:txBody>
       </p:sp>
@@ -1278,18 +1278,18 @@
           <a:bodyPr/>
           <a:lstStyle/>
           <a:p>
-            <a:fld id="{282D6D79-DA7E-4C38-B43B-8F3E90E82397}" type="slidenum">
-              <a:rPr lang="en-US" smtClean="0"/>
+            <a:fld id="{2AC86D11-95AB-4D54-A55D-3E4BE70CA48F}" type="slidenum">
+              <a:rPr lang="es-ES" smtClean="0"/>
               <a:t>‹Nº›</a:t>
             </a:fld>
-            <a:endParaRPr lang="en-US"/>
+            <a:endParaRPr lang="es-ES"/>
           </a:p>
         </p:txBody>
       </p:sp>
     </p:spTree>
     <p:extLst>
       <p:ext uri="{BB962C8B-B14F-4D97-AF65-F5344CB8AC3E}">
-        <p14:creationId xmlns:p14="http://schemas.microsoft.com/office/powerpoint/2010/main" val="1710506630"/>
+        <p14:creationId xmlns:p14="http://schemas.microsoft.com/office/powerpoint/2010/main" val="129620926"/>
       </p:ext>
     </p:extLst>
   </p:cSld>
@@ -1340,7 +1340,7 @@
               <a:rPr lang="es-ES" smtClean="0"/>
               <a:t>Haga clic para modificar el estilo de título del patrón</a:t>
             </a:r>
-            <a:endParaRPr lang="en-US"/>
+            <a:endParaRPr lang="es-ES"/>
           </a:p>
         </p:txBody>
       </p:sp>
@@ -1462,7 +1462,7 @@
               <a:rPr lang="es-ES" smtClean="0"/>
               <a:t>Quinto nivel</a:t>
             </a:r>
-            <a:endParaRPr lang="en-US"/>
+            <a:endParaRPr lang="es-ES"/>
           </a:p>
         </p:txBody>
       </p:sp>
@@ -1584,7 +1584,7 @@
               <a:rPr lang="es-ES" smtClean="0"/>
               <a:t>Quinto nivel</a:t>
             </a:r>
-            <a:endParaRPr lang="en-US"/>
+            <a:endParaRPr lang="es-ES"/>
           </a:p>
         </p:txBody>
       </p:sp>
@@ -1603,11 +1603,11 @@
           <a:bodyPr/>
           <a:lstStyle/>
           <a:p>
-            <a:fld id="{87C21B04-3BFD-4195-953B-842DE72845A9}" type="datetimeFigureOut">
-              <a:rPr lang="en-US" smtClean="0"/>
-              <a:t>8/20/2018</a:t>
+            <a:fld id="{CB7C35F1-2967-47B1-ABA0-D6ECBDD2FDCA}" type="datetimeFigureOut">
+              <a:rPr lang="es-ES" smtClean="0"/>
+              <a:t>06/08/2018</a:t>
             </a:fld>
-            <a:endParaRPr lang="en-US"/>
+            <a:endParaRPr lang="es-ES"/>
           </a:p>
         </p:txBody>
       </p:sp>
@@ -1626,7 +1626,7 @@
           <a:bodyPr/>
           <a:lstStyle/>
           <a:p>
-            <a:endParaRPr lang="en-US"/>
+            <a:endParaRPr lang="es-ES"/>
           </a:p>
         </p:txBody>
       </p:sp>
@@ -1645,18 +1645,18 @@
           <a:bodyPr/>
           <a:lstStyle/>
           <a:p>
-            <a:fld id="{282D6D79-DA7E-4C38-B43B-8F3E90E82397}" type="slidenum">
-              <a:rPr lang="en-US" smtClean="0"/>
+            <a:fld id="{2AC86D11-95AB-4D54-A55D-3E4BE70CA48F}" type="slidenum">
+              <a:rPr lang="es-ES" smtClean="0"/>
               <a:t>‹Nº›</a:t>
             </a:fld>
-            <a:endParaRPr lang="en-US"/>
+            <a:endParaRPr lang="es-ES"/>
           </a:p>
         </p:txBody>
       </p:sp>
     </p:spTree>
     <p:extLst>
       <p:ext uri="{BB962C8B-B14F-4D97-AF65-F5344CB8AC3E}">
-        <p14:creationId xmlns:p14="http://schemas.microsoft.com/office/powerpoint/2010/main" val="2819241074"/>
+        <p14:creationId xmlns:p14="http://schemas.microsoft.com/office/powerpoint/2010/main" val="2581025708"/>
       </p:ext>
     </p:extLst>
   </p:cSld>
@@ -1702,7 +1702,7 @@
               <a:rPr lang="es-ES" smtClean="0"/>
               <a:t>Haga clic para modificar el estilo de título del patrón</a:t>
             </a:r>
-            <a:endParaRPr lang="en-US"/>
+            <a:endParaRPr lang="es-ES"/>
           </a:p>
         </p:txBody>
       </p:sp>
@@ -1721,11 +1721,11 @@
           <a:bodyPr/>
           <a:lstStyle/>
           <a:p>
-            <a:fld id="{87C21B04-3BFD-4195-953B-842DE72845A9}" type="datetimeFigureOut">
-              <a:rPr lang="en-US" smtClean="0"/>
-              <a:t>8/20/2018</a:t>
+            <a:fld id="{CB7C35F1-2967-47B1-ABA0-D6ECBDD2FDCA}" type="datetimeFigureOut">
+              <a:rPr lang="es-ES" smtClean="0"/>
+              <a:t>06/08/2018</a:t>
             </a:fld>
-            <a:endParaRPr lang="en-US"/>
+            <a:endParaRPr lang="es-ES"/>
           </a:p>
         </p:txBody>
       </p:sp>
@@ -1744,7 +1744,7 @@
           <a:bodyPr/>
           <a:lstStyle/>
           <a:p>
-            <a:endParaRPr lang="en-US"/>
+            <a:endParaRPr lang="es-ES"/>
           </a:p>
         </p:txBody>
       </p:sp>
@@ -1763,18 +1763,18 @@
           <a:bodyPr/>
           <a:lstStyle/>
           <a:p>
-            <a:fld id="{282D6D79-DA7E-4C38-B43B-8F3E90E82397}" type="slidenum">
-              <a:rPr lang="en-US" smtClean="0"/>
+            <a:fld id="{2AC86D11-95AB-4D54-A55D-3E4BE70CA48F}" type="slidenum">
+              <a:rPr lang="es-ES" smtClean="0"/>
               <a:t>‹Nº›</a:t>
             </a:fld>
-            <a:endParaRPr lang="en-US"/>
+            <a:endParaRPr lang="es-ES"/>
           </a:p>
         </p:txBody>
       </p:sp>
     </p:spTree>
     <p:extLst>
       <p:ext uri="{BB962C8B-B14F-4D97-AF65-F5344CB8AC3E}">
-        <p14:creationId xmlns:p14="http://schemas.microsoft.com/office/powerpoint/2010/main" val="2492004053"/>
+        <p14:creationId xmlns:p14="http://schemas.microsoft.com/office/powerpoint/2010/main" val="2516054566"/>
       </p:ext>
     </p:extLst>
   </p:cSld>
@@ -1816,11 +1816,11 @@
           <a:bodyPr/>
           <a:lstStyle/>
           <a:p>
-            <a:fld id="{87C21B04-3BFD-4195-953B-842DE72845A9}" type="datetimeFigureOut">
-              <a:rPr lang="en-US" smtClean="0"/>
-              <a:t>8/20/2018</a:t>
+            <a:fld id="{CB7C35F1-2967-47B1-ABA0-D6ECBDD2FDCA}" type="datetimeFigureOut">
+              <a:rPr lang="es-ES" smtClean="0"/>
+              <a:t>06/08/2018</a:t>
             </a:fld>
-            <a:endParaRPr lang="en-US"/>
+            <a:endParaRPr lang="es-ES"/>
           </a:p>
         </p:txBody>
       </p:sp>
@@ -1839,7 +1839,7 @@
           <a:bodyPr/>
           <a:lstStyle/>
           <a:p>
-            <a:endParaRPr lang="en-US"/>
+            <a:endParaRPr lang="es-ES"/>
           </a:p>
         </p:txBody>
       </p:sp>
@@ -1858,18 +1858,18 @@
           <a:bodyPr/>
           <a:lstStyle/>
           <a:p>
-            <a:fld id="{282D6D79-DA7E-4C38-B43B-8F3E90E82397}" type="slidenum">
-              <a:rPr lang="en-US" smtClean="0"/>
+            <a:fld id="{2AC86D11-95AB-4D54-A55D-3E4BE70CA48F}" type="slidenum">
+              <a:rPr lang="es-ES" smtClean="0"/>
               <a:t>‹Nº›</a:t>
             </a:fld>
-            <a:endParaRPr lang="en-US"/>
+            <a:endParaRPr lang="es-ES"/>
           </a:p>
         </p:txBody>
       </p:sp>
     </p:spTree>
     <p:extLst>
       <p:ext uri="{BB962C8B-B14F-4D97-AF65-F5344CB8AC3E}">
-        <p14:creationId xmlns:p14="http://schemas.microsoft.com/office/powerpoint/2010/main" val="3527145557"/>
+        <p14:creationId xmlns:p14="http://schemas.microsoft.com/office/powerpoint/2010/main" val="1877712458"/>
       </p:ext>
     </p:extLst>
   </p:cSld>
@@ -1924,7 +1924,7 @@
               <a:rPr lang="es-ES" smtClean="0"/>
               <a:t>Haga clic para modificar el estilo de título del patrón</a:t>
             </a:r>
-            <a:endParaRPr lang="en-US"/>
+            <a:endParaRPr lang="es-ES"/>
           </a:p>
         </p:txBody>
       </p:sp>
@@ -2009,7 +2009,7 @@
               <a:rPr lang="es-ES" smtClean="0"/>
               <a:t>Quinto nivel</a:t>
             </a:r>
-            <a:endParaRPr lang="en-US"/>
+            <a:endParaRPr lang="es-ES"/>
           </a:p>
         </p:txBody>
       </p:sp>
@@ -2093,11 +2093,11 @@
           <a:bodyPr/>
           <a:lstStyle/>
           <a:p>
-            <a:fld id="{87C21B04-3BFD-4195-953B-842DE72845A9}" type="datetimeFigureOut">
-              <a:rPr lang="en-US" smtClean="0"/>
-              <a:t>8/20/2018</a:t>
+            <a:fld id="{CB7C35F1-2967-47B1-ABA0-D6ECBDD2FDCA}" type="datetimeFigureOut">
+              <a:rPr lang="es-ES" smtClean="0"/>
+              <a:t>06/08/2018</a:t>
             </a:fld>
-            <a:endParaRPr lang="en-US"/>
+            <a:endParaRPr lang="es-ES"/>
           </a:p>
         </p:txBody>
       </p:sp>
@@ -2116,7 +2116,7 @@
           <a:bodyPr/>
           <a:lstStyle/>
           <a:p>
-            <a:endParaRPr lang="en-US"/>
+            <a:endParaRPr lang="es-ES"/>
           </a:p>
         </p:txBody>
       </p:sp>
@@ -2135,18 +2135,18 @@
           <a:bodyPr/>
           <a:lstStyle/>
           <a:p>
-            <a:fld id="{282D6D79-DA7E-4C38-B43B-8F3E90E82397}" type="slidenum">
-              <a:rPr lang="en-US" smtClean="0"/>
+            <a:fld id="{2AC86D11-95AB-4D54-A55D-3E4BE70CA48F}" type="slidenum">
+              <a:rPr lang="es-ES" smtClean="0"/>
               <a:t>‹Nº›</a:t>
             </a:fld>
-            <a:endParaRPr lang="en-US"/>
+            <a:endParaRPr lang="es-ES"/>
           </a:p>
         </p:txBody>
       </p:sp>
     </p:spTree>
     <p:extLst>
       <p:ext uri="{BB962C8B-B14F-4D97-AF65-F5344CB8AC3E}">
-        <p14:creationId xmlns:p14="http://schemas.microsoft.com/office/powerpoint/2010/main" val="4258965092"/>
+        <p14:creationId xmlns:p14="http://schemas.microsoft.com/office/powerpoint/2010/main" val="2814506958"/>
       </p:ext>
     </p:extLst>
   </p:cSld>
@@ -2201,7 +2201,7 @@
               <a:rPr lang="es-ES" smtClean="0"/>
               <a:t>Haga clic para modificar el estilo de título del patrón</a:t>
             </a:r>
-            <a:endParaRPr lang="en-US"/>
+            <a:endParaRPr lang="es-ES"/>
           </a:p>
         </p:txBody>
       </p:sp>
@@ -2262,7 +2262,7 @@
             </a:lvl9pPr>
           </a:lstStyle>
           <a:p>
-            <a:endParaRPr lang="en-US"/>
+            <a:endParaRPr lang="es-ES"/>
           </a:p>
         </p:txBody>
       </p:sp>
@@ -2346,11 +2346,11 @@
           <a:bodyPr/>
           <a:lstStyle/>
           <a:p>
-            <a:fld id="{87C21B04-3BFD-4195-953B-842DE72845A9}" type="datetimeFigureOut">
-              <a:rPr lang="en-US" smtClean="0"/>
-              <a:t>8/20/2018</a:t>
+            <a:fld id="{CB7C35F1-2967-47B1-ABA0-D6ECBDD2FDCA}" type="datetimeFigureOut">
+              <a:rPr lang="es-ES" smtClean="0"/>
+              <a:t>06/08/2018</a:t>
             </a:fld>
-            <a:endParaRPr lang="en-US"/>
+            <a:endParaRPr lang="es-ES"/>
           </a:p>
         </p:txBody>
       </p:sp>
@@ -2369,7 +2369,7 @@
           <a:bodyPr/>
           <a:lstStyle/>
           <a:p>
-            <a:endParaRPr lang="en-US"/>
+            <a:endParaRPr lang="es-ES"/>
           </a:p>
         </p:txBody>
       </p:sp>
@@ -2388,18 +2388,18 @@
           <a:bodyPr/>
           <a:lstStyle/>
           <a:p>
-            <a:fld id="{282D6D79-DA7E-4C38-B43B-8F3E90E82397}" type="slidenum">
-              <a:rPr lang="en-US" smtClean="0"/>
+            <a:fld id="{2AC86D11-95AB-4D54-A55D-3E4BE70CA48F}" type="slidenum">
+              <a:rPr lang="es-ES" smtClean="0"/>
               <a:t>‹Nº›</a:t>
             </a:fld>
-            <a:endParaRPr lang="en-US"/>
+            <a:endParaRPr lang="es-ES"/>
           </a:p>
         </p:txBody>
       </p:sp>
     </p:spTree>
     <p:extLst>
       <p:ext uri="{BB962C8B-B14F-4D97-AF65-F5344CB8AC3E}">
-        <p14:creationId xmlns:p14="http://schemas.microsoft.com/office/powerpoint/2010/main" val="875962881"/>
+        <p14:creationId xmlns:p14="http://schemas.microsoft.com/office/powerpoint/2010/main" val="2857179246"/>
       </p:ext>
     </p:extLst>
   </p:cSld>
@@ -2460,7 +2460,7 @@
               <a:rPr lang="es-ES" smtClean="0"/>
               <a:t>Haga clic para modificar el estilo de título del patrón</a:t>
             </a:r>
-            <a:endParaRPr lang="en-US"/>
+            <a:endParaRPr lang="es-ES"/>
           </a:p>
         </p:txBody>
       </p:sp>
@@ -2522,7 +2522,7 @@
               <a:rPr lang="es-ES" smtClean="0"/>
               <a:t>Quinto nivel</a:t>
             </a:r>
-            <a:endParaRPr lang="en-US"/>
+            <a:endParaRPr lang="es-ES"/>
           </a:p>
         </p:txBody>
       </p:sp>
@@ -2559,11 +2559,11 @@
             </a:lvl1pPr>
           </a:lstStyle>
           <a:p>
-            <a:fld id="{87C21B04-3BFD-4195-953B-842DE72845A9}" type="datetimeFigureOut">
-              <a:rPr lang="en-US" smtClean="0"/>
-              <a:t>8/20/2018</a:t>
+            <a:fld id="{CB7C35F1-2967-47B1-ABA0-D6ECBDD2FDCA}" type="datetimeFigureOut">
+              <a:rPr lang="es-ES" smtClean="0"/>
+              <a:t>06/08/2018</a:t>
             </a:fld>
-            <a:endParaRPr lang="en-US"/>
+            <a:endParaRPr lang="es-ES"/>
           </a:p>
         </p:txBody>
       </p:sp>
@@ -2600,7 +2600,7 @@
             </a:lvl1pPr>
           </a:lstStyle>
           <a:p>
-            <a:endParaRPr lang="en-US"/>
+            <a:endParaRPr lang="es-ES"/>
           </a:p>
         </p:txBody>
       </p:sp>
@@ -2637,18 +2637,18 @@
             </a:lvl1pPr>
           </a:lstStyle>
           <a:p>
-            <a:fld id="{282D6D79-DA7E-4C38-B43B-8F3E90E82397}" type="slidenum">
-              <a:rPr lang="en-US" smtClean="0"/>
+            <a:fld id="{2AC86D11-95AB-4D54-A55D-3E4BE70CA48F}" type="slidenum">
+              <a:rPr lang="es-ES" smtClean="0"/>
               <a:t>‹Nº›</a:t>
             </a:fld>
-            <a:endParaRPr lang="en-US"/>
+            <a:endParaRPr lang="es-ES"/>
           </a:p>
         </p:txBody>
       </p:sp>
     </p:spTree>
     <p:extLst>
       <p:ext uri="{BB962C8B-B14F-4D97-AF65-F5344CB8AC3E}">
-        <p14:creationId xmlns:p14="http://schemas.microsoft.com/office/powerpoint/2010/main" val="920138128"/>
+        <p14:creationId xmlns:p14="http://schemas.microsoft.com/office/powerpoint/2010/main" val="464177610"/>
       </p:ext>
     </p:extLst>
   </p:cSld>
@@ -2852,7 +2852,7 @@
     </p:bodyStyle>
     <p:otherStyle>
       <a:defPPr>
-        <a:defRPr lang="en-US"/>
+        <a:defRPr lang="es-ES"/>
       </a:defPPr>
       <a:lvl1pPr marL="0" algn="l" defTabSz="914400" rtl="0" eaLnBrk="1" latinLnBrk="0" hangingPunct="1">
         <a:defRPr sz="1800" kern="1200">
@@ -2952,6 +2952,184 @@
 <file path=ppt/slides/slide1.xml><?xml version="1.0" encoding="utf-8"?>
 <p:sld xmlns:a="http://schemas.openxmlformats.org/drawingml/2006/main" xmlns:r="http://schemas.openxmlformats.org/officeDocument/2006/relationships" xmlns:p="http://schemas.openxmlformats.org/presentationml/2006/main">
   <p:cSld>
+    <p:bg>
+      <p:bgPr>
+        <a:solidFill>
+          <a:schemeClr val="bg2">
+            <a:lumMod val="75000"/>
+          </a:schemeClr>
+        </a:solidFill>
+        <a:effectLst/>
+      </p:bgPr>
+    </p:bg>
+    <p:spTree>
+      <p:nvGrpSpPr>
+        <p:cNvPr id="1" name=""/>
+        <p:cNvGrpSpPr/>
+        <p:nvPr/>
+      </p:nvGrpSpPr>
+      <p:grpSpPr>
+        <a:xfrm>
+          <a:off x="0" y="0"/>
+          <a:ext cx="0" cy="0"/>
+          <a:chOff x="0" y="0"/>
+          <a:chExt cx="0" cy="0"/>
+        </a:xfrm>
+      </p:grpSpPr>
+      <p:sp>
+        <p:nvSpPr>
+          <p:cNvPr id="2" name="Título 1"/>
+          <p:cNvSpPr>
+            <a:spLocks noGrp="1"/>
+          </p:cNvSpPr>
+          <p:nvPr>
+            <p:ph type="ctrTitle"/>
+          </p:nvPr>
+        </p:nvSpPr>
+        <p:spPr/>
+        <p:txBody>
+          <a:bodyPr/>
+          <a:lstStyle/>
+          <a:p>
+            <a:endParaRPr lang="es-ES" dirty="0"/>
+          </a:p>
+        </p:txBody>
+      </p:sp>
+      <p:sp>
+        <p:nvSpPr>
+          <p:cNvPr id="3" name="Subtítulo 2"/>
+          <p:cNvSpPr>
+            <a:spLocks noGrp="1"/>
+          </p:cNvSpPr>
+          <p:nvPr>
+            <p:ph type="subTitle" idx="1"/>
+          </p:nvPr>
+        </p:nvSpPr>
+        <p:spPr/>
+        <p:txBody>
+          <a:bodyPr/>
+          <a:lstStyle/>
+          <a:p>
+            <a:endParaRPr lang="es-ES"/>
+          </a:p>
+        </p:txBody>
+      </p:sp>
+      <p:pic>
+        <p:nvPicPr>
+          <p:cNvPr id="4" name="Imagen 3"/>
+          <p:cNvPicPr>
+            <a:picLocks noChangeAspect="1"/>
+          </p:cNvPicPr>
+          <p:nvPr/>
+        </p:nvPicPr>
+        <p:blipFill>
+          <a:blip r:embed="rId2">
+            <a:extLst>
+              <a:ext uri="{28A0092B-C50C-407E-A947-70E740481C1C}">
+                <a14:useLocalDpi xmlns:a14="http://schemas.microsoft.com/office/drawing/2010/main" val="0"/>
+              </a:ext>
+            </a:extLst>
+          </a:blip>
+          <a:stretch>
+            <a:fillRect/>
+          </a:stretch>
+        </p:blipFill>
+        <p:spPr>
+          <a:xfrm>
+            <a:off x="620202" y="540689"/>
+            <a:ext cx="3658901" cy="5603143"/>
+          </a:xfrm>
+          <a:prstGeom prst="rect">
+            <a:avLst/>
+          </a:prstGeom>
+        </p:spPr>
+      </p:pic>
+      <p:pic>
+        <p:nvPicPr>
+          <p:cNvPr id="5" name="Imagen 4"/>
+          <p:cNvPicPr>
+            <a:picLocks noChangeAspect="1"/>
+          </p:cNvPicPr>
+          <p:nvPr/>
+        </p:nvPicPr>
+        <p:blipFill>
+          <a:blip r:embed="rId3">
+            <a:extLst>
+              <a:ext uri="{28A0092B-C50C-407E-A947-70E740481C1C}">
+                <a14:useLocalDpi xmlns:a14="http://schemas.microsoft.com/office/drawing/2010/main" val="0"/>
+              </a:ext>
+            </a:extLst>
+          </a:blip>
+          <a:stretch>
+            <a:fillRect/>
+          </a:stretch>
+        </p:blipFill>
+        <p:spPr>
+          <a:xfrm>
+            <a:off x="8024689" y="540689"/>
+            <a:ext cx="3441092" cy="5603143"/>
+          </a:xfrm>
+          <a:prstGeom prst="rect">
+            <a:avLst/>
+          </a:prstGeom>
+        </p:spPr>
+      </p:pic>
+      <p:pic>
+        <p:nvPicPr>
+          <p:cNvPr id="6" name="Imagen 5"/>
+          <p:cNvPicPr>
+            <a:picLocks noChangeAspect="1"/>
+          </p:cNvPicPr>
+          <p:nvPr/>
+        </p:nvPicPr>
+        <p:blipFill>
+          <a:blip r:embed="rId4" cstate="print">
+            <a:extLst>
+              <a:ext uri="{28A0092B-C50C-407E-A947-70E740481C1C}">
+                <a14:useLocalDpi xmlns:a14="http://schemas.microsoft.com/office/drawing/2010/main" val="0"/>
+              </a:ext>
+            </a:extLst>
+          </a:blip>
+          <a:stretch>
+            <a:fillRect/>
+          </a:stretch>
+        </p:blipFill>
+        <p:spPr>
+          <a:xfrm rot="5400000">
+            <a:off x="3335917" y="1657505"/>
+            <a:ext cx="5620885" cy="3387259"/>
+          </a:xfrm>
+          <a:prstGeom prst="rect">
+            <a:avLst/>
+          </a:prstGeom>
+        </p:spPr>
+      </p:pic>
+    </p:spTree>
+    <p:extLst>
+      <p:ext uri="{BB962C8B-B14F-4D97-AF65-F5344CB8AC3E}">
+        <p14:creationId xmlns:p14="http://schemas.microsoft.com/office/powerpoint/2010/main" val="1181332899"/>
+      </p:ext>
+    </p:extLst>
+  </p:cSld>
+  <p:clrMapOvr>
+    <a:masterClrMapping/>
+  </p:clrMapOvr>
+</p:sld>
+</file>
+
+<file path=ppt/slides/slide2.xml><?xml version="1.0" encoding="utf-8"?>
+<p:sld xmlns:a="http://schemas.openxmlformats.org/drawingml/2006/main" xmlns:r="http://schemas.openxmlformats.org/officeDocument/2006/relationships" xmlns:p="http://schemas.openxmlformats.org/presentationml/2006/main">
+  <p:cSld>
+    <p:bg>
+      <p:bgPr>
+        <a:solidFill>
+          <a:schemeClr val="bg2">
+            <a:lumMod val="75000"/>
+          </a:schemeClr>
+        </a:solidFill>
+        <a:effectLst/>
+      </p:bgPr>
+    </p:bg>
     <p:spTree>
       <p:nvGrpSpPr>
         <p:cNvPr id="1" name=""/>
@@ -2968,44 +3146,38 @@
       </p:grpSpPr>
       <p:pic>
         <p:nvPicPr>
-          <p:cNvPr id="7" name="Imagen 6"/>
+          <p:cNvPr id="5" name="Imagen 4"/>
           <p:cNvPicPr>
             <a:picLocks noChangeAspect="1"/>
           </p:cNvPicPr>
           <p:nvPr/>
         </p:nvPicPr>
         <p:blipFill>
-          <a:blip r:embed="rId2"/>
+          <a:blip r:embed="rId2">
+            <a:extLst>
+              <a:ext uri="{28A0092B-C50C-407E-A947-70E740481C1C}">
+                <a14:useLocalDpi xmlns:a14="http://schemas.microsoft.com/office/drawing/2010/main" val="0"/>
+              </a:ext>
+            </a:extLst>
+          </a:blip>
           <a:stretch>
             <a:fillRect/>
           </a:stretch>
         </p:blipFill>
         <p:spPr>
           <a:xfrm>
-            <a:off x="1581150" y="414337"/>
-            <a:ext cx="9029700" cy="6029325"/>
+            <a:off x="1376624" y="341643"/>
+            <a:ext cx="9766997" cy="6129495"/>
           </a:xfrm>
           <a:prstGeom prst="rect">
             <a:avLst/>
           </a:prstGeom>
-          <a:ln w="228600" cap="sq" cmpd="thickThin">
-            <a:solidFill>
-              <a:srgbClr val="7030A0"/>
-            </a:solidFill>
-            <a:prstDash val="solid"/>
-            <a:miter lim="800000"/>
-          </a:ln>
-          <a:effectLst>
-            <a:innerShdw blurRad="76200">
-              <a:srgbClr val="000000"/>
-            </a:innerShdw>
-          </a:effectLst>
         </p:spPr>
       </p:pic>
     </p:spTree>
     <p:extLst>
       <p:ext uri="{BB962C8B-B14F-4D97-AF65-F5344CB8AC3E}">
-        <p14:creationId xmlns:p14="http://schemas.microsoft.com/office/powerpoint/2010/main" val="1098800373"/>
+        <p14:creationId xmlns:p14="http://schemas.microsoft.com/office/powerpoint/2010/main" val="2755777187"/>
       </p:ext>
     </p:extLst>
   </p:cSld>
@@ -3015,9 +3187,19 @@
 </p:sld>
 </file>
 
-<file path=ppt/slides/slide2.xml><?xml version="1.0" encoding="utf-8"?>
+<file path=ppt/slides/slide3.xml><?xml version="1.0" encoding="utf-8"?>
 <p:sld xmlns:a="http://schemas.openxmlformats.org/drawingml/2006/main" xmlns:r="http://schemas.openxmlformats.org/officeDocument/2006/relationships" xmlns:p="http://schemas.openxmlformats.org/presentationml/2006/main">
   <p:cSld>
+    <p:bg>
+      <p:bgPr>
+        <a:solidFill>
+          <a:schemeClr val="bg2">
+            <a:lumMod val="75000"/>
+          </a:schemeClr>
+        </a:solidFill>
+        <a:effectLst/>
+      </p:bgPr>
+    </p:bg>
     <p:spTree>
       <p:nvGrpSpPr>
         <p:cNvPr id="1" name=""/>
@@ -3034,110 +3216,37 @@
       </p:grpSpPr>
       <p:pic>
         <p:nvPicPr>
-          <p:cNvPr id="4" name="Imagen 3"/>
+          <p:cNvPr id="4" name="Marcador de contenido 3"/>
           <p:cNvPicPr>
-            <a:picLocks noChangeAspect="1"/>
+            <a:picLocks noGrp="1" noChangeAspect="1"/>
           </p:cNvPicPr>
-          <p:nvPr/>
+          <p:nvPr>
+            <p:ph idx="1"/>
+          </p:nvPr>
         </p:nvPicPr>
         <p:blipFill>
-          <a:blip r:embed="rId2"/>
+          <a:blip r:embed="rId2">
+            <a:extLst>
+              <a:ext uri="{28A0092B-C50C-407E-A947-70E740481C1C}">
+                <a14:useLocalDpi xmlns:a14="http://schemas.microsoft.com/office/drawing/2010/main" val="0"/>
+              </a:ext>
+            </a:extLst>
+          </a:blip>
           <a:stretch>
             <a:fillRect/>
           </a:stretch>
         </p:blipFill>
         <p:spPr>
           <a:xfrm>
-            <a:off x="1214437" y="376237"/>
-            <a:ext cx="9763125" cy="6105525"/>
+            <a:off x="1564194" y="365125"/>
+            <a:ext cx="9063612" cy="6072179"/>
           </a:xfrm>
-          <a:prstGeom prst="rect">
-            <a:avLst/>
-          </a:prstGeom>
-          <a:ln w="228600" cap="sq" cmpd="thickThin">
-            <a:solidFill>
-              <a:srgbClr val="7030A0"/>
-            </a:solidFill>
-            <a:prstDash val="solid"/>
-            <a:miter lim="800000"/>
-          </a:ln>
-          <a:effectLst>
-            <a:innerShdw blurRad="76200">
-              <a:srgbClr val="000000"/>
-            </a:innerShdw>
-          </a:effectLst>
         </p:spPr>
       </p:pic>
     </p:spTree>
     <p:extLst>
       <p:ext uri="{BB962C8B-B14F-4D97-AF65-F5344CB8AC3E}">
-        <p14:creationId xmlns:p14="http://schemas.microsoft.com/office/powerpoint/2010/main" val="3053501745"/>
-      </p:ext>
-    </p:extLst>
-  </p:cSld>
-  <p:clrMapOvr>
-    <a:masterClrMapping/>
-  </p:clrMapOvr>
-</p:sld>
-</file>
-
-<file path=ppt/slides/slide3.xml><?xml version="1.0" encoding="utf-8"?>
-<p:sld xmlns:a="http://schemas.openxmlformats.org/drawingml/2006/main" xmlns:r="http://schemas.openxmlformats.org/officeDocument/2006/relationships" xmlns:p="http://schemas.openxmlformats.org/presentationml/2006/main">
-  <p:cSld>
-    <p:spTree>
-      <p:nvGrpSpPr>
-        <p:cNvPr id="1" name=""/>
-        <p:cNvGrpSpPr/>
-        <p:nvPr/>
-      </p:nvGrpSpPr>
-      <p:grpSpPr>
-        <a:xfrm>
-          <a:off x="0" y="0"/>
-          <a:ext cx="0" cy="0"/>
-          <a:chOff x="0" y="0"/>
-          <a:chExt cx="0" cy="0"/>
-        </a:xfrm>
-      </p:grpSpPr>
-      <p:pic>
-        <p:nvPicPr>
-          <p:cNvPr id="4" name="Imagen 3"/>
-          <p:cNvPicPr>
-            <a:picLocks noChangeAspect="1"/>
-          </p:cNvPicPr>
-          <p:nvPr/>
-        </p:nvPicPr>
-        <p:blipFill>
-          <a:blip r:embed="rId2"/>
-          <a:stretch>
-            <a:fillRect/>
-          </a:stretch>
-        </p:blipFill>
-        <p:spPr>
-          <a:xfrm>
-            <a:off x="1174079" y="392781"/>
-            <a:ext cx="10313572" cy="5494672"/>
-          </a:xfrm>
-          <a:prstGeom prst="rect">
-            <a:avLst/>
-          </a:prstGeom>
-          <a:ln w="228600" cap="sq" cmpd="thickThin">
-            <a:solidFill>
-              <a:srgbClr val="7030A0"/>
-            </a:solidFill>
-            <a:prstDash val="solid"/>
-            <a:miter lim="800000"/>
-          </a:ln>
-          <a:effectLst>
-            <a:innerShdw blurRad="76200">
-              <a:srgbClr val="000000"/>
-            </a:innerShdw>
-          </a:effectLst>
-        </p:spPr>
-      </p:pic>
-    </p:spTree>
-    <p:extLst>
-      <p:ext uri="{BB962C8B-B14F-4D97-AF65-F5344CB8AC3E}">
-        <p14:creationId xmlns:p14="http://schemas.microsoft.com/office/powerpoint/2010/main" val="1582955174"/>
+        <p14:creationId xmlns:p14="http://schemas.microsoft.com/office/powerpoint/2010/main" val="1199086444"/>
       </p:ext>
     </p:extLst>
   </p:cSld>

</xml_diff>

<commit_message>
Actualizacion de Katherine Williams
</commit_message>
<xml_diff>
--- a/img/carrusel/Presentación1.pptx
+++ b/img/carrusel/Presentación1.pptx
@@ -6,14 +6,14 @@
   </p:sldMasterIdLst>
   <p:sldIdLst>
     <p:sldId id="256" r:id="rId2"/>
-    <p:sldId id="257" r:id="rId3"/>
-    <p:sldId id="258" r:id="rId4"/>
+    <p:sldId id="258" r:id="rId3"/>
+    <p:sldId id="257" r:id="rId4"/>
   </p:sldIdLst>
   <p:sldSz cx="12192000" cy="6858000"/>
   <p:notesSz cx="6858000" cy="9144000"/>
   <p:defaultTextStyle>
     <a:defPPr>
-      <a:defRPr lang="es-ES"/>
+      <a:defRPr lang="en-US"/>
     </a:defPPr>
     <a:lvl1pPr marL="0" algn="l" defTabSz="914400" rtl="0" eaLnBrk="1" latinLnBrk="0" hangingPunct="1">
       <a:defRPr sz="1800" kern="1200">
@@ -154,7 +154,7 @@
               <a:rPr lang="es-ES" smtClean="0"/>
               <a:t>Haga clic para modificar el estilo de título del patrón</a:t>
             </a:r>
-            <a:endParaRPr lang="es-ES"/>
+            <a:endParaRPr lang="en-US"/>
           </a:p>
         </p:txBody>
       </p:sp>
@@ -219,7 +219,7 @@
               <a:rPr lang="es-ES" smtClean="0"/>
               <a:t>Haga clic para modificar el estilo de subtítulo del patrón</a:t>
             </a:r>
-            <a:endParaRPr lang="es-ES"/>
+            <a:endParaRPr lang="en-US"/>
           </a:p>
         </p:txBody>
       </p:sp>
@@ -238,11 +238,11 @@
           <a:bodyPr/>
           <a:lstStyle/>
           <a:p>
-            <a:fld id="{CB7C35F1-2967-47B1-ABA0-D6ECBDD2FDCA}" type="datetimeFigureOut">
-              <a:rPr lang="es-ES" smtClean="0"/>
-              <a:t>06/08/2018</a:t>
+            <a:fld id="{87C21B04-3BFD-4195-953B-842DE72845A9}" type="datetimeFigureOut">
+              <a:rPr lang="en-US" smtClean="0"/>
+              <a:t>8/20/2018</a:t>
             </a:fld>
-            <a:endParaRPr lang="es-ES"/>
+            <a:endParaRPr lang="en-US"/>
           </a:p>
         </p:txBody>
       </p:sp>
@@ -261,7 +261,7 @@
           <a:bodyPr/>
           <a:lstStyle/>
           <a:p>
-            <a:endParaRPr lang="es-ES"/>
+            <a:endParaRPr lang="en-US"/>
           </a:p>
         </p:txBody>
       </p:sp>
@@ -280,18 +280,18 @@
           <a:bodyPr/>
           <a:lstStyle/>
           <a:p>
-            <a:fld id="{2AC86D11-95AB-4D54-A55D-3E4BE70CA48F}" type="slidenum">
-              <a:rPr lang="es-ES" smtClean="0"/>
+            <a:fld id="{282D6D79-DA7E-4C38-B43B-8F3E90E82397}" type="slidenum">
+              <a:rPr lang="en-US" smtClean="0"/>
               <a:t>‹Nº›</a:t>
             </a:fld>
-            <a:endParaRPr lang="es-ES"/>
+            <a:endParaRPr lang="en-US"/>
           </a:p>
         </p:txBody>
       </p:sp>
     </p:spTree>
     <p:extLst>
       <p:ext uri="{BB962C8B-B14F-4D97-AF65-F5344CB8AC3E}">
-        <p14:creationId xmlns:p14="http://schemas.microsoft.com/office/powerpoint/2010/main" val="651000721"/>
+        <p14:creationId xmlns:p14="http://schemas.microsoft.com/office/powerpoint/2010/main" val="4138249826"/>
       </p:ext>
     </p:extLst>
   </p:cSld>
@@ -337,7 +337,7 @@
               <a:rPr lang="es-ES" smtClean="0"/>
               <a:t>Haga clic para modificar el estilo de título del patrón</a:t>
             </a:r>
-            <a:endParaRPr lang="es-ES"/>
+            <a:endParaRPr lang="en-US"/>
           </a:p>
         </p:txBody>
       </p:sp>
@@ -389,7 +389,7 @@
               <a:rPr lang="es-ES" smtClean="0"/>
               <a:t>Quinto nivel</a:t>
             </a:r>
-            <a:endParaRPr lang="es-ES"/>
+            <a:endParaRPr lang="en-US"/>
           </a:p>
         </p:txBody>
       </p:sp>
@@ -408,11 +408,11 @@
           <a:bodyPr/>
           <a:lstStyle/>
           <a:p>
-            <a:fld id="{CB7C35F1-2967-47B1-ABA0-D6ECBDD2FDCA}" type="datetimeFigureOut">
-              <a:rPr lang="es-ES" smtClean="0"/>
-              <a:t>06/08/2018</a:t>
+            <a:fld id="{87C21B04-3BFD-4195-953B-842DE72845A9}" type="datetimeFigureOut">
+              <a:rPr lang="en-US" smtClean="0"/>
+              <a:t>8/20/2018</a:t>
             </a:fld>
-            <a:endParaRPr lang="es-ES"/>
+            <a:endParaRPr lang="en-US"/>
           </a:p>
         </p:txBody>
       </p:sp>
@@ -431,7 +431,7 @@
           <a:bodyPr/>
           <a:lstStyle/>
           <a:p>
-            <a:endParaRPr lang="es-ES"/>
+            <a:endParaRPr lang="en-US"/>
           </a:p>
         </p:txBody>
       </p:sp>
@@ -450,18 +450,18 @@
           <a:bodyPr/>
           <a:lstStyle/>
           <a:p>
-            <a:fld id="{2AC86D11-95AB-4D54-A55D-3E4BE70CA48F}" type="slidenum">
-              <a:rPr lang="es-ES" smtClean="0"/>
+            <a:fld id="{282D6D79-DA7E-4C38-B43B-8F3E90E82397}" type="slidenum">
+              <a:rPr lang="en-US" smtClean="0"/>
               <a:t>‹Nº›</a:t>
             </a:fld>
-            <a:endParaRPr lang="es-ES"/>
+            <a:endParaRPr lang="en-US"/>
           </a:p>
         </p:txBody>
       </p:sp>
     </p:spTree>
     <p:extLst>
       <p:ext uri="{BB962C8B-B14F-4D97-AF65-F5344CB8AC3E}">
-        <p14:creationId xmlns:p14="http://schemas.microsoft.com/office/powerpoint/2010/main" val="4272878317"/>
+        <p14:creationId xmlns:p14="http://schemas.microsoft.com/office/powerpoint/2010/main" val="3090923053"/>
       </p:ext>
     </p:extLst>
   </p:cSld>
@@ -512,7 +512,7 @@
               <a:rPr lang="es-ES" smtClean="0"/>
               <a:t>Haga clic para modificar el estilo de título del patrón</a:t>
             </a:r>
-            <a:endParaRPr lang="es-ES"/>
+            <a:endParaRPr lang="en-US"/>
           </a:p>
         </p:txBody>
       </p:sp>
@@ -569,7 +569,7 @@
               <a:rPr lang="es-ES" smtClean="0"/>
               <a:t>Quinto nivel</a:t>
             </a:r>
-            <a:endParaRPr lang="es-ES"/>
+            <a:endParaRPr lang="en-US"/>
           </a:p>
         </p:txBody>
       </p:sp>
@@ -588,11 +588,11 @@
           <a:bodyPr/>
           <a:lstStyle/>
           <a:p>
-            <a:fld id="{CB7C35F1-2967-47B1-ABA0-D6ECBDD2FDCA}" type="datetimeFigureOut">
-              <a:rPr lang="es-ES" smtClean="0"/>
-              <a:t>06/08/2018</a:t>
+            <a:fld id="{87C21B04-3BFD-4195-953B-842DE72845A9}" type="datetimeFigureOut">
+              <a:rPr lang="en-US" smtClean="0"/>
+              <a:t>8/20/2018</a:t>
             </a:fld>
-            <a:endParaRPr lang="es-ES"/>
+            <a:endParaRPr lang="en-US"/>
           </a:p>
         </p:txBody>
       </p:sp>
@@ -611,7 +611,7 @@
           <a:bodyPr/>
           <a:lstStyle/>
           <a:p>
-            <a:endParaRPr lang="es-ES"/>
+            <a:endParaRPr lang="en-US"/>
           </a:p>
         </p:txBody>
       </p:sp>
@@ -630,18 +630,18 @@
           <a:bodyPr/>
           <a:lstStyle/>
           <a:p>
-            <a:fld id="{2AC86D11-95AB-4D54-A55D-3E4BE70CA48F}" type="slidenum">
-              <a:rPr lang="es-ES" smtClean="0"/>
+            <a:fld id="{282D6D79-DA7E-4C38-B43B-8F3E90E82397}" type="slidenum">
+              <a:rPr lang="en-US" smtClean="0"/>
               <a:t>‹Nº›</a:t>
             </a:fld>
-            <a:endParaRPr lang="es-ES"/>
+            <a:endParaRPr lang="en-US"/>
           </a:p>
         </p:txBody>
       </p:sp>
     </p:spTree>
     <p:extLst>
       <p:ext uri="{BB962C8B-B14F-4D97-AF65-F5344CB8AC3E}">
-        <p14:creationId xmlns:p14="http://schemas.microsoft.com/office/powerpoint/2010/main" val="1394968067"/>
+        <p14:creationId xmlns:p14="http://schemas.microsoft.com/office/powerpoint/2010/main" val="4173914836"/>
       </p:ext>
     </p:extLst>
   </p:cSld>
@@ -687,7 +687,7 @@
               <a:rPr lang="es-ES" smtClean="0"/>
               <a:t>Haga clic para modificar el estilo de título del patrón</a:t>
             </a:r>
-            <a:endParaRPr lang="es-ES"/>
+            <a:endParaRPr lang="en-US"/>
           </a:p>
         </p:txBody>
       </p:sp>
@@ -739,7 +739,7 @@
               <a:rPr lang="es-ES" smtClean="0"/>
               <a:t>Quinto nivel</a:t>
             </a:r>
-            <a:endParaRPr lang="es-ES"/>
+            <a:endParaRPr lang="en-US"/>
           </a:p>
         </p:txBody>
       </p:sp>
@@ -758,11 +758,11 @@
           <a:bodyPr/>
           <a:lstStyle/>
           <a:p>
-            <a:fld id="{CB7C35F1-2967-47B1-ABA0-D6ECBDD2FDCA}" type="datetimeFigureOut">
-              <a:rPr lang="es-ES" smtClean="0"/>
-              <a:t>06/08/2018</a:t>
+            <a:fld id="{87C21B04-3BFD-4195-953B-842DE72845A9}" type="datetimeFigureOut">
+              <a:rPr lang="en-US" smtClean="0"/>
+              <a:t>8/20/2018</a:t>
             </a:fld>
-            <a:endParaRPr lang="es-ES"/>
+            <a:endParaRPr lang="en-US"/>
           </a:p>
         </p:txBody>
       </p:sp>
@@ -781,7 +781,7 @@
           <a:bodyPr/>
           <a:lstStyle/>
           <a:p>
-            <a:endParaRPr lang="es-ES"/>
+            <a:endParaRPr lang="en-US"/>
           </a:p>
         </p:txBody>
       </p:sp>
@@ -800,18 +800,18 @@
           <a:bodyPr/>
           <a:lstStyle/>
           <a:p>
-            <a:fld id="{2AC86D11-95AB-4D54-A55D-3E4BE70CA48F}" type="slidenum">
-              <a:rPr lang="es-ES" smtClean="0"/>
+            <a:fld id="{282D6D79-DA7E-4C38-B43B-8F3E90E82397}" type="slidenum">
+              <a:rPr lang="en-US" smtClean="0"/>
               <a:t>‹Nº›</a:t>
             </a:fld>
-            <a:endParaRPr lang="es-ES"/>
+            <a:endParaRPr lang="en-US"/>
           </a:p>
         </p:txBody>
       </p:sp>
     </p:spTree>
     <p:extLst>
       <p:ext uri="{BB962C8B-B14F-4D97-AF65-F5344CB8AC3E}">
-        <p14:creationId xmlns:p14="http://schemas.microsoft.com/office/powerpoint/2010/main" val="673281061"/>
+        <p14:creationId xmlns:p14="http://schemas.microsoft.com/office/powerpoint/2010/main" val="2085084184"/>
       </p:ext>
     </p:extLst>
   </p:cSld>
@@ -866,7 +866,7 @@
               <a:rPr lang="es-ES" smtClean="0"/>
               <a:t>Haga clic para modificar el estilo de título del patrón</a:t>
             </a:r>
-            <a:endParaRPr lang="es-ES"/>
+            <a:endParaRPr lang="en-US"/>
           </a:p>
         </p:txBody>
       </p:sp>
@@ -1004,11 +1004,11 @@
           <a:bodyPr/>
           <a:lstStyle/>
           <a:p>
-            <a:fld id="{CB7C35F1-2967-47B1-ABA0-D6ECBDD2FDCA}" type="datetimeFigureOut">
-              <a:rPr lang="es-ES" smtClean="0"/>
-              <a:t>06/08/2018</a:t>
+            <a:fld id="{87C21B04-3BFD-4195-953B-842DE72845A9}" type="datetimeFigureOut">
+              <a:rPr lang="en-US" smtClean="0"/>
+              <a:t>8/20/2018</a:t>
             </a:fld>
-            <a:endParaRPr lang="es-ES"/>
+            <a:endParaRPr lang="en-US"/>
           </a:p>
         </p:txBody>
       </p:sp>
@@ -1027,7 +1027,7 @@
           <a:bodyPr/>
           <a:lstStyle/>
           <a:p>
-            <a:endParaRPr lang="es-ES"/>
+            <a:endParaRPr lang="en-US"/>
           </a:p>
         </p:txBody>
       </p:sp>
@@ -1046,18 +1046,18 @@
           <a:bodyPr/>
           <a:lstStyle/>
           <a:p>
-            <a:fld id="{2AC86D11-95AB-4D54-A55D-3E4BE70CA48F}" type="slidenum">
-              <a:rPr lang="es-ES" smtClean="0"/>
+            <a:fld id="{282D6D79-DA7E-4C38-B43B-8F3E90E82397}" type="slidenum">
+              <a:rPr lang="en-US" smtClean="0"/>
               <a:t>‹Nº›</a:t>
             </a:fld>
-            <a:endParaRPr lang="es-ES"/>
+            <a:endParaRPr lang="en-US"/>
           </a:p>
         </p:txBody>
       </p:sp>
     </p:spTree>
     <p:extLst>
       <p:ext uri="{BB962C8B-B14F-4D97-AF65-F5344CB8AC3E}">
-        <p14:creationId xmlns:p14="http://schemas.microsoft.com/office/powerpoint/2010/main" val="793594111"/>
+        <p14:creationId xmlns:p14="http://schemas.microsoft.com/office/powerpoint/2010/main" val="2511605569"/>
       </p:ext>
     </p:extLst>
   </p:cSld>
@@ -1103,7 +1103,7 @@
               <a:rPr lang="es-ES" smtClean="0"/>
               <a:t>Haga clic para modificar el estilo de título del patrón</a:t>
             </a:r>
-            <a:endParaRPr lang="es-ES"/>
+            <a:endParaRPr lang="en-US"/>
           </a:p>
         </p:txBody>
       </p:sp>
@@ -1160,7 +1160,7 @@
               <a:rPr lang="es-ES" smtClean="0"/>
               <a:t>Quinto nivel</a:t>
             </a:r>
-            <a:endParaRPr lang="es-ES"/>
+            <a:endParaRPr lang="en-US"/>
           </a:p>
         </p:txBody>
       </p:sp>
@@ -1217,7 +1217,7 @@
               <a:rPr lang="es-ES" smtClean="0"/>
               <a:t>Quinto nivel</a:t>
             </a:r>
-            <a:endParaRPr lang="es-ES"/>
+            <a:endParaRPr lang="en-US"/>
           </a:p>
         </p:txBody>
       </p:sp>
@@ -1236,11 +1236,11 @@
           <a:bodyPr/>
           <a:lstStyle/>
           <a:p>
-            <a:fld id="{CB7C35F1-2967-47B1-ABA0-D6ECBDD2FDCA}" type="datetimeFigureOut">
-              <a:rPr lang="es-ES" smtClean="0"/>
-              <a:t>06/08/2018</a:t>
+            <a:fld id="{87C21B04-3BFD-4195-953B-842DE72845A9}" type="datetimeFigureOut">
+              <a:rPr lang="en-US" smtClean="0"/>
+              <a:t>8/20/2018</a:t>
             </a:fld>
-            <a:endParaRPr lang="es-ES"/>
+            <a:endParaRPr lang="en-US"/>
           </a:p>
         </p:txBody>
       </p:sp>
@@ -1259,7 +1259,7 @@
           <a:bodyPr/>
           <a:lstStyle/>
           <a:p>
-            <a:endParaRPr lang="es-ES"/>
+            <a:endParaRPr lang="en-US"/>
           </a:p>
         </p:txBody>
       </p:sp>
@@ -1278,18 +1278,18 @@
           <a:bodyPr/>
           <a:lstStyle/>
           <a:p>
-            <a:fld id="{2AC86D11-95AB-4D54-A55D-3E4BE70CA48F}" type="slidenum">
-              <a:rPr lang="es-ES" smtClean="0"/>
+            <a:fld id="{282D6D79-DA7E-4C38-B43B-8F3E90E82397}" type="slidenum">
+              <a:rPr lang="en-US" smtClean="0"/>
               <a:t>‹Nº›</a:t>
             </a:fld>
-            <a:endParaRPr lang="es-ES"/>
+            <a:endParaRPr lang="en-US"/>
           </a:p>
         </p:txBody>
       </p:sp>
     </p:spTree>
     <p:extLst>
       <p:ext uri="{BB962C8B-B14F-4D97-AF65-F5344CB8AC3E}">
-        <p14:creationId xmlns:p14="http://schemas.microsoft.com/office/powerpoint/2010/main" val="129620926"/>
+        <p14:creationId xmlns:p14="http://schemas.microsoft.com/office/powerpoint/2010/main" val="1710506630"/>
       </p:ext>
     </p:extLst>
   </p:cSld>
@@ -1340,7 +1340,7 @@
               <a:rPr lang="es-ES" smtClean="0"/>
               <a:t>Haga clic para modificar el estilo de título del patrón</a:t>
             </a:r>
-            <a:endParaRPr lang="es-ES"/>
+            <a:endParaRPr lang="en-US"/>
           </a:p>
         </p:txBody>
       </p:sp>
@@ -1462,7 +1462,7 @@
               <a:rPr lang="es-ES" smtClean="0"/>
               <a:t>Quinto nivel</a:t>
             </a:r>
-            <a:endParaRPr lang="es-ES"/>
+            <a:endParaRPr lang="en-US"/>
           </a:p>
         </p:txBody>
       </p:sp>
@@ -1584,7 +1584,7 @@
               <a:rPr lang="es-ES" smtClean="0"/>
               <a:t>Quinto nivel</a:t>
             </a:r>
-            <a:endParaRPr lang="es-ES"/>
+            <a:endParaRPr lang="en-US"/>
           </a:p>
         </p:txBody>
       </p:sp>
@@ -1603,11 +1603,11 @@
           <a:bodyPr/>
           <a:lstStyle/>
           <a:p>
-            <a:fld id="{CB7C35F1-2967-47B1-ABA0-D6ECBDD2FDCA}" type="datetimeFigureOut">
-              <a:rPr lang="es-ES" smtClean="0"/>
-              <a:t>06/08/2018</a:t>
+            <a:fld id="{87C21B04-3BFD-4195-953B-842DE72845A9}" type="datetimeFigureOut">
+              <a:rPr lang="en-US" smtClean="0"/>
+              <a:t>8/20/2018</a:t>
             </a:fld>
-            <a:endParaRPr lang="es-ES"/>
+            <a:endParaRPr lang="en-US"/>
           </a:p>
         </p:txBody>
       </p:sp>
@@ -1626,7 +1626,7 @@
           <a:bodyPr/>
           <a:lstStyle/>
           <a:p>
-            <a:endParaRPr lang="es-ES"/>
+            <a:endParaRPr lang="en-US"/>
           </a:p>
         </p:txBody>
       </p:sp>
@@ -1645,18 +1645,18 @@
           <a:bodyPr/>
           <a:lstStyle/>
           <a:p>
-            <a:fld id="{2AC86D11-95AB-4D54-A55D-3E4BE70CA48F}" type="slidenum">
-              <a:rPr lang="es-ES" smtClean="0"/>
+            <a:fld id="{282D6D79-DA7E-4C38-B43B-8F3E90E82397}" type="slidenum">
+              <a:rPr lang="en-US" smtClean="0"/>
               <a:t>‹Nº›</a:t>
             </a:fld>
-            <a:endParaRPr lang="es-ES"/>
+            <a:endParaRPr lang="en-US"/>
           </a:p>
         </p:txBody>
       </p:sp>
     </p:spTree>
     <p:extLst>
       <p:ext uri="{BB962C8B-B14F-4D97-AF65-F5344CB8AC3E}">
-        <p14:creationId xmlns:p14="http://schemas.microsoft.com/office/powerpoint/2010/main" val="2581025708"/>
+        <p14:creationId xmlns:p14="http://schemas.microsoft.com/office/powerpoint/2010/main" val="2819241074"/>
       </p:ext>
     </p:extLst>
   </p:cSld>
@@ -1702,7 +1702,7 @@
               <a:rPr lang="es-ES" smtClean="0"/>
               <a:t>Haga clic para modificar el estilo de título del patrón</a:t>
             </a:r>
-            <a:endParaRPr lang="es-ES"/>
+            <a:endParaRPr lang="en-US"/>
           </a:p>
         </p:txBody>
       </p:sp>
@@ -1721,11 +1721,11 @@
           <a:bodyPr/>
           <a:lstStyle/>
           <a:p>
-            <a:fld id="{CB7C35F1-2967-47B1-ABA0-D6ECBDD2FDCA}" type="datetimeFigureOut">
-              <a:rPr lang="es-ES" smtClean="0"/>
-              <a:t>06/08/2018</a:t>
+            <a:fld id="{87C21B04-3BFD-4195-953B-842DE72845A9}" type="datetimeFigureOut">
+              <a:rPr lang="en-US" smtClean="0"/>
+              <a:t>8/20/2018</a:t>
             </a:fld>
-            <a:endParaRPr lang="es-ES"/>
+            <a:endParaRPr lang="en-US"/>
           </a:p>
         </p:txBody>
       </p:sp>
@@ -1744,7 +1744,7 @@
           <a:bodyPr/>
           <a:lstStyle/>
           <a:p>
-            <a:endParaRPr lang="es-ES"/>
+            <a:endParaRPr lang="en-US"/>
           </a:p>
         </p:txBody>
       </p:sp>
@@ -1763,18 +1763,18 @@
           <a:bodyPr/>
           <a:lstStyle/>
           <a:p>
-            <a:fld id="{2AC86D11-95AB-4D54-A55D-3E4BE70CA48F}" type="slidenum">
-              <a:rPr lang="es-ES" smtClean="0"/>
+            <a:fld id="{282D6D79-DA7E-4C38-B43B-8F3E90E82397}" type="slidenum">
+              <a:rPr lang="en-US" smtClean="0"/>
               <a:t>‹Nº›</a:t>
             </a:fld>
-            <a:endParaRPr lang="es-ES"/>
+            <a:endParaRPr lang="en-US"/>
           </a:p>
         </p:txBody>
       </p:sp>
     </p:spTree>
     <p:extLst>
       <p:ext uri="{BB962C8B-B14F-4D97-AF65-F5344CB8AC3E}">
-        <p14:creationId xmlns:p14="http://schemas.microsoft.com/office/powerpoint/2010/main" val="2516054566"/>
+        <p14:creationId xmlns:p14="http://schemas.microsoft.com/office/powerpoint/2010/main" val="2492004053"/>
       </p:ext>
     </p:extLst>
   </p:cSld>
@@ -1816,11 +1816,11 @@
           <a:bodyPr/>
           <a:lstStyle/>
           <a:p>
-            <a:fld id="{CB7C35F1-2967-47B1-ABA0-D6ECBDD2FDCA}" type="datetimeFigureOut">
-              <a:rPr lang="es-ES" smtClean="0"/>
-              <a:t>06/08/2018</a:t>
+            <a:fld id="{87C21B04-3BFD-4195-953B-842DE72845A9}" type="datetimeFigureOut">
+              <a:rPr lang="en-US" smtClean="0"/>
+              <a:t>8/20/2018</a:t>
             </a:fld>
-            <a:endParaRPr lang="es-ES"/>
+            <a:endParaRPr lang="en-US"/>
           </a:p>
         </p:txBody>
       </p:sp>
@@ -1839,7 +1839,7 @@
           <a:bodyPr/>
           <a:lstStyle/>
           <a:p>
-            <a:endParaRPr lang="es-ES"/>
+            <a:endParaRPr lang="en-US"/>
           </a:p>
         </p:txBody>
       </p:sp>
@@ -1858,18 +1858,18 @@
           <a:bodyPr/>
           <a:lstStyle/>
           <a:p>
-            <a:fld id="{2AC86D11-95AB-4D54-A55D-3E4BE70CA48F}" type="slidenum">
-              <a:rPr lang="es-ES" smtClean="0"/>
+            <a:fld id="{282D6D79-DA7E-4C38-B43B-8F3E90E82397}" type="slidenum">
+              <a:rPr lang="en-US" smtClean="0"/>
               <a:t>‹Nº›</a:t>
             </a:fld>
-            <a:endParaRPr lang="es-ES"/>
+            <a:endParaRPr lang="en-US"/>
           </a:p>
         </p:txBody>
       </p:sp>
     </p:spTree>
     <p:extLst>
       <p:ext uri="{BB962C8B-B14F-4D97-AF65-F5344CB8AC3E}">
-        <p14:creationId xmlns:p14="http://schemas.microsoft.com/office/powerpoint/2010/main" val="1877712458"/>
+        <p14:creationId xmlns:p14="http://schemas.microsoft.com/office/powerpoint/2010/main" val="3527145557"/>
       </p:ext>
     </p:extLst>
   </p:cSld>
@@ -1924,7 +1924,7 @@
               <a:rPr lang="es-ES" smtClean="0"/>
               <a:t>Haga clic para modificar el estilo de título del patrón</a:t>
             </a:r>
-            <a:endParaRPr lang="es-ES"/>
+            <a:endParaRPr lang="en-US"/>
           </a:p>
         </p:txBody>
       </p:sp>
@@ -2009,7 +2009,7 @@
               <a:rPr lang="es-ES" smtClean="0"/>
               <a:t>Quinto nivel</a:t>
             </a:r>
-            <a:endParaRPr lang="es-ES"/>
+            <a:endParaRPr lang="en-US"/>
           </a:p>
         </p:txBody>
       </p:sp>
@@ -2093,11 +2093,11 @@
           <a:bodyPr/>
           <a:lstStyle/>
           <a:p>
-            <a:fld id="{CB7C35F1-2967-47B1-ABA0-D6ECBDD2FDCA}" type="datetimeFigureOut">
-              <a:rPr lang="es-ES" smtClean="0"/>
-              <a:t>06/08/2018</a:t>
+            <a:fld id="{87C21B04-3BFD-4195-953B-842DE72845A9}" type="datetimeFigureOut">
+              <a:rPr lang="en-US" smtClean="0"/>
+              <a:t>8/20/2018</a:t>
             </a:fld>
-            <a:endParaRPr lang="es-ES"/>
+            <a:endParaRPr lang="en-US"/>
           </a:p>
         </p:txBody>
       </p:sp>
@@ -2116,7 +2116,7 @@
           <a:bodyPr/>
           <a:lstStyle/>
           <a:p>
-            <a:endParaRPr lang="es-ES"/>
+            <a:endParaRPr lang="en-US"/>
           </a:p>
         </p:txBody>
       </p:sp>
@@ -2135,18 +2135,18 @@
           <a:bodyPr/>
           <a:lstStyle/>
           <a:p>
-            <a:fld id="{2AC86D11-95AB-4D54-A55D-3E4BE70CA48F}" type="slidenum">
-              <a:rPr lang="es-ES" smtClean="0"/>
+            <a:fld id="{282D6D79-DA7E-4C38-B43B-8F3E90E82397}" type="slidenum">
+              <a:rPr lang="en-US" smtClean="0"/>
               <a:t>‹Nº›</a:t>
             </a:fld>
-            <a:endParaRPr lang="es-ES"/>
+            <a:endParaRPr lang="en-US"/>
           </a:p>
         </p:txBody>
       </p:sp>
     </p:spTree>
     <p:extLst>
       <p:ext uri="{BB962C8B-B14F-4D97-AF65-F5344CB8AC3E}">
-        <p14:creationId xmlns:p14="http://schemas.microsoft.com/office/powerpoint/2010/main" val="2814506958"/>
+        <p14:creationId xmlns:p14="http://schemas.microsoft.com/office/powerpoint/2010/main" val="4258965092"/>
       </p:ext>
     </p:extLst>
   </p:cSld>
@@ -2201,7 +2201,7 @@
               <a:rPr lang="es-ES" smtClean="0"/>
               <a:t>Haga clic para modificar el estilo de título del patrón</a:t>
             </a:r>
-            <a:endParaRPr lang="es-ES"/>
+            <a:endParaRPr lang="en-US"/>
           </a:p>
         </p:txBody>
       </p:sp>
@@ -2262,7 +2262,7 @@
             </a:lvl9pPr>
           </a:lstStyle>
           <a:p>
-            <a:endParaRPr lang="es-ES"/>
+            <a:endParaRPr lang="en-US"/>
           </a:p>
         </p:txBody>
       </p:sp>
@@ -2346,11 +2346,11 @@
           <a:bodyPr/>
           <a:lstStyle/>
           <a:p>
-            <a:fld id="{CB7C35F1-2967-47B1-ABA0-D6ECBDD2FDCA}" type="datetimeFigureOut">
-              <a:rPr lang="es-ES" smtClean="0"/>
-              <a:t>06/08/2018</a:t>
+            <a:fld id="{87C21B04-3BFD-4195-953B-842DE72845A9}" type="datetimeFigureOut">
+              <a:rPr lang="en-US" smtClean="0"/>
+              <a:t>8/20/2018</a:t>
             </a:fld>
-            <a:endParaRPr lang="es-ES"/>
+            <a:endParaRPr lang="en-US"/>
           </a:p>
         </p:txBody>
       </p:sp>
@@ -2369,7 +2369,7 @@
           <a:bodyPr/>
           <a:lstStyle/>
           <a:p>
-            <a:endParaRPr lang="es-ES"/>
+            <a:endParaRPr lang="en-US"/>
           </a:p>
         </p:txBody>
       </p:sp>
@@ -2388,18 +2388,18 @@
           <a:bodyPr/>
           <a:lstStyle/>
           <a:p>
-            <a:fld id="{2AC86D11-95AB-4D54-A55D-3E4BE70CA48F}" type="slidenum">
-              <a:rPr lang="es-ES" smtClean="0"/>
+            <a:fld id="{282D6D79-DA7E-4C38-B43B-8F3E90E82397}" type="slidenum">
+              <a:rPr lang="en-US" smtClean="0"/>
               <a:t>‹Nº›</a:t>
             </a:fld>
-            <a:endParaRPr lang="es-ES"/>
+            <a:endParaRPr lang="en-US"/>
           </a:p>
         </p:txBody>
       </p:sp>
     </p:spTree>
     <p:extLst>
       <p:ext uri="{BB962C8B-B14F-4D97-AF65-F5344CB8AC3E}">
-        <p14:creationId xmlns:p14="http://schemas.microsoft.com/office/powerpoint/2010/main" val="2857179246"/>
+        <p14:creationId xmlns:p14="http://schemas.microsoft.com/office/powerpoint/2010/main" val="875962881"/>
       </p:ext>
     </p:extLst>
   </p:cSld>
@@ -2460,7 +2460,7 @@
               <a:rPr lang="es-ES" smtClean="0"/>
               <a:t>Haga clic para modificar el estilo de título del patrón</a:t>
             </a:r>
-            <a:endParaRPr lang="es-ES"/>
+            <a:endParaRPr lang="en-US"/>
           </a:p>
         </p:txBody>
       </p:sp>
@@ -2522,7 +2522,7 @@
               <a:rPr lang="es-ES" smtClean="0"/>
               <a:t>Quinto nivel</a:t>
             </a:r>
-            <a:endParaRPr lang="es-ES"/>
+            <a:endParaRPr lang="en-US"/>
           </a:p>
         </p:txBody>
       </p:sp>
@@ -2559,11 +2559,11 @@
             </a:lvl1pPr>
           </a:lstStyle>
           <a:p>
-            <a:fld id="{CB7C35F1-2967-47B1-ABA0-D6ECBDD2FDCA}" type="datetimeFigureOut">
-              <a:rPr lang="es-ES" smtClean="0"/>
-              <a:t>06/08/2018</a:t>
+            <a:fld id="{87C21B04-3BFD-4195-953B-842DE72845A9}" type="datetimeFigureOut">
+              <a:rPr lang="en-US" smtClean="0"/>
+              <a:t>8/20/2018</a:t>
             </a:fld>
-            <a:endParaRPr lang="es-ES"/>
+            <a:endParaRPr lang="en-US"/>
           </a:p>
         </p:txBody>
       </p:sp>
@@ -2600,7 +2600,7 @@
             </a:lvl1pPr>
           </a:lstStyle>
           <a:p>
-            <a:endParaRPr lang="es-ES"/>
+            <a:endParaRPr lang="en-US"/>
           </a:p>
         </p:txBody>
       </p:sp>
@@ -2637,18 +2637,18 @@
             </a:lvl1pPr>
           </a:lstStyle>
           <a:p>
-            <a:fld id="{2AC86D11-95AB-4D54-A55D-3E4BE70CA48F}" type="slidenum">
-              <a:rPr lang="es-ES" smtClean="0"/>
+            <a:fld id="{282D6D79-DA7E-4C38-B43B-8F3E90E82397}" type="slidenum">
+              <a:rPr lang="en-US" smtClean="0"/>
               <a:t>‹Nº›</a:t>
             </a:fld>
-            <a:endParaRPr lang="es-ES"/>
+            <a:endParaRPr lang="en-US"/>
           </a:p>
         </p:txBody>
       </p:sp>
     </p:spTree>
     <p:extLst>
       <p:ext uri="{BB962C8B-B14F-4D97-AF65-F5344CB8AC3E}">
-        <p14:creationId xmlns:p14="http://schemas.microsoft.com/office/powerpoint/2010/main" val="464177610"/>
+        <p14:creationId xmlns:p14="http://schemas.microsoft.com/office/powerpoint/2010/main" val="920138128"/>
       </p:ext>
     </p:extLst>
   </p:cSld>
@@ -2852,7 +2852,7 @@
     </p:bodyStyle>
     <p:otherStyle>
       <a:defPPr>
-        <a:defRPr lang="es-ES"/>
+        <a:defRPr lang="en-US"/>
       </a:defPPr>
       <a:lvl1pPr marL="0" algn="l" defTabSz="914400" rtl="0" eaLnBrk="1" latinLnBrk="0" hangingPunct="1">
         <a:defRPr sz="1800" kern="1200">
@@ -2952,184 +2952,6 @@
 <file path=ppt/slides/slide1.xml><?xml version="1.0" encoding="utf-8"?>
 <p:sld xmlns:a="http://schemas.openxmlformats.org/drawingml/2006/main" xmlns:r="http://schemas.openxmlformats.org/officeDocument/2006/relationships" xmlns:p="http://schemas.openxmlformats.org/presentationml/2006/main">
   <p:cSld>
-    <p:bg>
-      <p:bgPr>
-        <a:solidFill>
-          <a:schemeClr val="bg2">
-            <a:lumMod val="75000"/>
-          </a:schemeClr>
-        </a:solidFill>
-        <a:effectLst/>
-      </p:bgPr>
-    </p:bg>
-    <p:spTree>
-      <p:nvGrpSpPr>
-        <p:cNvPr id="1" name=""/>
-        <p:cNvGrpSpPr/>
-        <p:nvPr/>
-      </p:nvGrpSpPr>
-      <p:grpSpPr>
-        <a:xfrm>
-          <a:off x="0" y="0"/>
-          <a:ext cx="0" cy="0"/>
-          <a:chOff x="0" y="0"/>
-          <a:chExt cx="0" cy="0"/>
-        </a:xfrm>
-      </p:grpSpPr>
-      <p:sp>
-        <p:nvSpPr>
-          <p:cNvPr id="2" name="Título 1"/>
-          <p:cNvSpPr>
-            <a:spLocks noGrp="1"/>
-          </p:cNvSpPr>
-          <p:nvPr>
-            <p:ph type="ctrTitle"/>
-          </p:nvPr>
-        </p:nvSpPr>
-        <p:spPr/>
-        <p:txBody>
-          <a:bodyPr/>
-          <a:lstStyle/>
-          <a:p>
-            <a:endParaRPr lang="es-ES" dirty="0"/>
-          </a:p>
-        </p:txBody>
-      </p:sp>
-      <p:sp>
-        <p:nvSpPr>
-          <p:cNvPr id="3" name="Subtítulo 2"/>
-          <p:cNvSpPr>
-            <a:spLocks noGrp="1"/>
-          </p:cNvSpPr>
-          <p:nvPr>
-            <p:ph type="subTitle" idx="1"/>
-          </p:nvPr>
-        </p:nvSpPr>
-        <p:spPr/>
-        <p:txBody>
-          <a:bodyPr/>
-          <a:lstStyle/>
-          <a:p>
-            <a:endParaRPr lang="es-ES"/>
-          </a:p>
-        </p:txBody>
-      </p:sp>
-      <p:pic>
-        <p:nvPicPr>
-          <p:cNvPr id="4" name="Imagen 3"/>
-          <p:cNvPicPr>
-            <a:picLocks noChangeAspect="1"/>
-          </p:cNvPicPr>
-          <p:nvPr/>
-        </p:nvPicPr>
-        <p:blipFill>
-          <a:blip r:embed="rId2">
-            <a:extLst>
-              <a:ext uri="{28A0092B-C50C-407E-A947-70E740481C1C}">
-                <a14:useLocalDpi xmlns:a14="http://schemas.microsoft.com/office/drawing/2010/main" val="0"/>
-              </a:ext>
-            </a:extLst>
-          </a:blip>
-          <a:stretch>
-            <a:fillRect/>
-          </a:stretch>
-        </p:blipFill>
-        <p:spPr>
-          <a:xfrm>
-            <a:off x="620202" y="540689"/>
-            <a:ext cx="3658901" cy="5603143"/>
-          </a:xfrm>
-          <a:prstGeom prst="rect">
-            <a:avLst/>
-          </a:prstGeom>
-        </p:spPr>
-      </p:pic>
-      <p:pic>
-        <p:nvPicPr>
-          <p:cNvPr id="5" name="Imagen 4"/>
-          <p:cNvPicPr>
-            <a:picLocks noChangeAspect="1"/>
-          </p:cNvPicPr>
-          <p:nvPr/>
-        </p:nvPicPr>
-        <p:blipFill>
-          <a:blip r:embed="rId3">
-            <a:extLst>
-              <a:ext uri="{28A0092B-C50C-407E-A947-70E740481C1C}">
-                <a14:useLocalDpi xmlns:a14="http://schemas.microsoft.com/office/drawing/2010/main" val="0"/>
-              </a:ext>
-            </a:extLst>
-          </a:blip>
-          <a:stretch>
-            <a:fillRect/>
-          </a:stretch>
-        </p:blipFill>
-        <p:spPr>
-          <a:xfrm>
-            <a:off x="8024689" y="540689"/>
-            <a:ext cx="3441092" cy="5603143"/>
-          </a:xfrm>
-          <a:prstGeom prst="rect">
-            <a:avLst/>
-          </a:prstGeom>
-        </p:spPr>
-      </p:pic>
-      <p:pic>
-        <p:nvPicPr>
-          <p:cNvPr id="6" name="Imagen 5"/>
-          <p:cNvPicPr>
-            <a:picLocks noChangeAspect="1"/>
-          </p:cNvPicPr>
-          <p:nvPr/>
-        </p:nvPicPr>
-        <p:blipFill>
-          <a:blip r:embed="rId4" cstate="print">
-            <a:extLst>
-              <a:ext uri="{28A0092B-C50C-407E-A947-70E740481C1C}">
-                <a14:useLocalDpi xmlns:a14="http://schemas.microsoft.com/office/drawing/2010/main" val="0"/>
-              </a:ext>
-            </a:extLst>
-          </a:blip>
-          <a:stretch>
-            <a:fillRect/>
-          </a:stretch>
-        </p:blipFill>
-        <p:spPr>
-          <a:xfrm rot="5400000">
-            <a:off x="3335917" y="1657505"/>
-            <a:ext cx="5620885" cy="3387259"/>
-          </a:xfrm>
-          <a:prstGeom prst="rect">
-            <a:avLst/>
-          </a:prstGeom>
-        </p:spPr>
-      </p:pic>
-    </p:spTree>
-    <p:extLst>
-      <p:ext uri="{BB962C8B-B14F-4D97-AF65-F5344CB8AC3E}">
-        <p14:creationId xmlns:p14="http://schemas.microsoft.com/office/powerpoint/2010/main" val="1181332899"/>
-      </p:ext>
-    </p:extLst>
-  </p:cSld>
-  <p:clrMapOvr>
-    <a:masterClrMapping/>
-  </p:clrMapOvr>
-</p:sld>
-</file>
-
-<file path=ppt/slides/slide2.xml><?xml version="1.0" encoding="utf-8"?>
-<p:sld xmlns:a="http://schemas.openxmlformats.org/drawingml/2006/main" xmlns:r="http://schemas.openxmlformats.org/officeDocument/2006/relationships" xmlns:p="http://schemas.openxmlformats.org/presentationml/2006/main">
-  <p:cSld>
-    <p:bg>
-      <p:bgPr>
-        <a:solidFill>
-          <a:schemeClr val="bg2">
-            <a:lumMod val="75000"/>
-          </a:schemeClr>
-        </a:solidFill>
-        <a:effectLst/>
-      </p:bgPr>
-    </p:bg>
     <p:spTree>
       <p:nvGrpSpPr>
         <p:cNvPr id="1" name=""/>
@@ -3146,38 +2968,44 @@
       </p:grpSpPr>
       <p:pic>
         <p:nvPicPr>
-          <p:cNvPr id="5" name="Imagen 4"/>
+          <p:cNvPr id="7" name="Imagen 6"/>
           <p:cNvPicPr>
             <a:picLocks noChangeAspect="1"/>
           </p:cNvPicPr>
           <p:nvPr/>
         </p:nvPicPr>
         <p:blipFill>
-          <a:blip r:embed="rId2">
-            <a:extLst>
-              <a:ext uri="{28A0092B-C50C-407E-A947-70E740481C1C}">
-                <a14:useLocalDpi xmlns:a14="http://schemas.microsoft.com/office/drawing/2010/main" val="0"/>
-              </a:ext>
-            </a:extLst>
-          </a:blip>
+          <a:blip r:embed="rId2"/>
           <a:stretch>
             <a:fillRect/>
           </a:stretch>
         </p:blipFill>
         <p:spPr>
           <a:xfrm>
-            <a:off x="1376624" y="341643"/>
-            <a:ext cx="9766997" cy="6129495"/>
+            <a:off x="1581150" y="414337"/>
+            <a:ext cx="9029700" cy="6029325"/>
           </a:xfrm>
           <a:prstGeom prst="rect">
             <a:avLst/>
           </a:prstGeom>
+          <a:ln w="228600" cap="sq" cmpd="thickThin">
+            <a:solidFill>
+              <a:srgbClr val="7030A0"/>
+            </a:solidFill>
+            <a:prstDash val="solid"/>
+            <a:miter lim="800000"/>
+          </a:ln>
+          <a:effectLst>
+            <a:innerShdw blurRad="76200">
+              <a:srgbClr val="000000"/>
+            </a:innerShdw>
+          </a:effectLst>
         </p:spPr>
       </p:pic>
     </p:spTree>
     <p:extLst>
       <p:ext uri="{BB962C8B-B14F-4D97-AF65-F5344CB8AC3E}">
-        <p14:creationId xmlns:p14="http://schemas.microsoft.com/office/powerpoint/2010/main" val="2755777187"/>
+        <p14:creationId xmlns:p14="http://schemas.microsoft.com/office/powerpoint/2010/main" val="1098800373"/>
       </p:ext>
     </p:extLst>
   </p:cSld>
@@ -3187,19 +3015,9 @@
 </p:sld>
 </file>
 
-<file path=ppt/slides/slide3.xml><?xml version="1.0" encoding="utf-8"?>
+<file path=ppt/slides/slide2.xml><?xml version="1.0" encoding="utf-8"?>
 <p:sld xmlns:a="http://schemas.openxmlformats.org/drawingml/2006/main" xmlns:r="http://schemas.openxmlformats.org/officeDocument/2006/relationships" xmlns:p="http://schemas.openxmlformats.org/presentationml/2006/main">
   <p:cSld>
-    <p:bg>
-      <p:bgPr>
-        <a:solidFill>
-          <a:schemeClr val="bg2">
-            <a:lumMod val="75000"/>
-          </a:schemeClr>
-        </a:solidFill>
-        <a:effectLst/>
-      </p:bgPr>
-    </p:bg>
     <p:spTree>
       <p:nvGrpSpPr>
         <p:cNvPr id="1" name=""/>
@@ -3216,37 +3034,110 @@
       </p:grpSpPr>
       <p:pic>
         <p:nvPicPr>
-          <p:cNvPr id="4" name="Marcador de contenido 3"/>
+          <p:cNvPr id="4" name="Imagen 3"/>
           <p:cNvPicPr>
-            <a:picLocks noGrp="1" noChangeAspect="1"/>
+            <a:picLocks noChangeAspect="1"/>
           </p:cNvPicPr>
-          <p:nvPr>
-            <p:ph idx="1"/>
-          </p:nvPr>
+          <p:nvPr/>
         </p:nvPicPr>
         <p:blipFill>
-          <a:blip r:embed="rId2">
-            <a:extLst>
-              <a:ext uri="{28A0092B-C50C-407E-A947-70E740481C1C}">
-                <a14:useLocalDpi xmlns:a14="http://schemas.microsoft.com/office/drawing/2010/main" val="0"/>
-              </a:ext>
-            </a:extLst>
-          </a:blip>
+          <a:blip r:embed="rId2"/>
           <a:stretch>
             <a:fillRect/>
           </a:stretch>
         </p:blipFill>
         <p:spPr>
           <a:xfrm>
-            <a:off x="1564194" y="365125"/>
-            <a:ext cx="9063612" cy="6072179"/>
+            <a:off x="1214437" y="376237"/>
+            <a:ext cx="9763125" cy="6105525"/>
           </a:xfrm>
+          <a:prstGeom prst="rect">
+            <a:avLst/>
+          </a:prstGeom>
+          <a:ln w="228600" cap="sq" cmpd="thickThin">
+            <a:solidFill>
+              <a:srgbClr val="7030A0"/>
+            </a:solidFill>
+            <a:prstDash val="solid"/>
+            <a:miter lim="800000"/>
+          </a:ln>
+          <a:effectLst>
+            <a:innerShdw blurRad="76200">
+              <a:srgbClr val="000000"/>
+            </a:innerShdw>
+          </a:effectLst>
         </p:spPr>
       </p:pic>
     </p:spTree>
     <p:extLst>
       <p:ext uri="{BB962C8B-B14F-4D97-AF65-F5344CB8AC3E}">
-        <p14:creationId xmlns:p14="http://schemas.microsoft.com/office/powerpoint/2010/main" val="1199086444"/>
+        <p14:creationId xmlns:p14="http://schemas.microsoft.com/office/powerpoint/2010/main" val="3053501745"/>
+      </p:ext>
+    </p:extLst>
+  </p:cSld>
+  <p:clrMapOvr>
+    <a:masterClrMapping/>
+  </p:clrMapOvr>
+</p:sld>
+</file>
+
+<file path=ppt/slides/slide3.xml><?xml version="1.0" encoding="utf-8"?>
+<p:sld xmlns:a="http://schemas.openxmlformats.org/drawingml/2006/main" xmlns:r="http://schemas.openxmlformats.org/officeDocument/2006/relationships" xmlns:p="http://schemas.openxmlformats.org/presentationml/2006/main">
+  <p:cSld>
+    <p:spTree>
+      <p:nvGrpSpPr>
+        <p:cNvPr id="1" name=""/>
+        <p:cNvGrpSpPr/>
+        <p:nvPr/>
+      </p:nvGrpSpPr>
+      <p:grpSpPr>
+        <a:xfrm>
+          <a:off x="0" y="0"/>
+          <a:ext cx="0" cy="0"/>
+          <a:chOff x="0" y="0"/>
+          <a:chExt cx="0" cy="0"/>
+        </a:xfrm>
+      </p:grpSpPr>
+      <p:pic>
+        <p:nvPicPr>
+          <p:cNvPr id="4" name="Imagen 3"/>
+          <p:cNvPicPr>
+            <a:picLocks noChangeAspect="1"/>
+          </p:cNvPicPr>
+          <p:nvPr/>
+        </p:nvPicPr>
+        <p:blipFill>
+          <a:blip r:embed="rId2"/>
+          <a:stretch>
+            <a:fillRect/>
+          </a:stretch>
+        </p:blipFill>
+        <p:spPr>
+          <a:xfrm>
+            <a:off x="1174079" y="392781"/>
+            <a:ext cx="10313572" cy="5494672"/>
+          </a:xfrm>
+          <a:prstGeom prst="rect">
+            <a:avLst/>
+          </a:prstGeom>
+          <a:ln w="228600" cap="sq" cmpd="thickThin">
+            <a:solidFill>
+              <a:srgbClr val="7030A0"/>
+            </a:solidFill>
+            <a:prstDash val="solid"/>
+            <a:miter lim="800000"/>
+          </a:ln>
+          <a:effectLst>
+            <a:innerShdw blurRad="76200">
+              <a:srgbClr val="000000"/>
+            </a:innerShdw>
+          </a:effectLst>
+        </p:spPr>
+      </p:pic>
+    </p:spTree>
+    <p:extLst>
+      <p:ext uri="{BB962C8B-B14F-4D97-AF65-F5344CB8AC3E}">
+        <p14:creationId xmlns:p14="http://schemas.microsoft.com/office/powerpoint/2010/main" val="1582955174"/>
       </p:ext>
     </p:extLst>
   </p:cSld>

</xml_diff>

<commit_message>
Revert "Actualizacion de Katherine Williams"
This reverts commit cfd60f5d9c7ef9ba07d3b5471e1a27febbfcf209.
</commit_message>
<xml_diff>
--- a/img/carrusel/Presentación1.pptx
+++ b/img/carrusel/Presentación1.pptx
@@ -6,14 +6,14 @@
   </p:sldMasterIdLst>
   <p:sldIdLst>
     <p:sldId id="256" r:id="rId2"/>
-    <p:sldId id="258" r:id="rId3"/>
-    <p:sldId id="257" r:id="rId4"/>
+    <p:sldId id="257" r:id="rId3"/>
+    <p:sldId id="258" r:id="rId4"/>
   </p:sldIdLst>
   <p:sldSz cx="12192000" cy="6858000"/>
   <p:notesSz cx="6858000" cy="9144000"/>
   <p:defaultTextStyle>
     <a:defPPr>
-      <a:defRPr lang="en-US"/>
+      <a:defRPr lang="es-ES"/>
     </a:defPPr>
     <a:lvl1pPr marL="0" algn="l" defTabSz="914400" rtl="0" eaLnBrk="1" latinLnBrk="0" hangingPunct="1">
       <a:defRPr sz="1800" kern="1200">
@@ -154,7 +154,7 @@
               <a:rPr lang="es-ES" smtClean="0"/>
               <a:t>Haga clic para modificar el estilo de título del patrón</a:t>
             </a:r>
-            <a:endParaRPr lang="en-US"/>
+            <a:endParaRPr lang="es-ES"/>
           </a:p>
         </p:txBody>
       </p:sp>
@@ -219,7 +219,7 @@
               <a:rPr lang="es-ES" smtClean="0"/>
               <a:t>Haga clic para modificar el estilo de subtítulo del patrón</a:t>
             </a:r>
-            <a:endParaRPr lang="en-US"/>
+            <a:endParaRPr lang="es-ES"/>
           </a:p>
         </p:txBody>
       </p:sp>
@@ -238,11 +238,11 @@
           <a:bodyPr/>
           <a:lstStyle/>
           <a:p>
-            <a:fld id="{87C21B04-3BFD-4195-953B-842DE72845A9}" type="datetimeFigureOut">
-              <a:rPr lang="en-US" smtClean="0"/>
-              <a:t>8/20/2018</a:t>
+            <a:fld id="{CB7C35F1-2967-47B1-ABA0-D6ECBDD2FDCA}" type="datetimeFigureOut">
+              <a:rPr lang="es-ES" smtClean="0"/>
+              <a:t>06/08/2018</a:t>
             </a:fld>
-            <a:endParaRPr lang="en-US"/>
+            <a:endParaRPr lang="es-ES"/>
           </a:p>
         </p:txBody>
       </p:sp>
@@ -261,7 +261,7 @@
           <a:bodyPr/>
           <a:lstStyle/>
           <a:p>
-            <a:endParaRPr lang="en-US"/>
+            <a:endParaRPr lang="es-ES"/>
           </a:p>
         </p:txBody>
       </p:sp>
@@ -280,18 +280,18 @@
           <a:bodyPr/>
           <a:lstStyle/>
           <a:p>
-            <a:fld id="{282D6D79-DA7E-4C38-B43B-8F3E90E82397}" type="slidenum">
-              <a:rPr lang="en-US" smtClean="0"/>
+            <a:fld id="{2AC86D11-95AB-4D54-A55D-3E4BE70CA48F}" type="slidenum">
+              <a:rPr lang="es-ES" smtClean="0"/>
               <a:t>‹Nº›</a:t>
             </a:fld>
-            <a:endParaRPr lang="en-US"/>
+            <a:endParaRPr lang="es-ES"/>
           </a:p>
         </p:txBody>
       </p:sp>
     </p:spTree>
     <p:extLst>
       <p:ext uri="{BB962C8B-B14F-4D97-AF65-F5344CB8AC3E}">
-        <p14:creationId xmlns:p14="http://schemas.microsoft.com/office/powerpoint/2010/main" val="4138249826"/>
+        <p14:creationId xmlns:p14="http://schemas.microsoft.com/office/powerpoint/2010/main" val="651000721"/>
       </p:ext>
     </p:extLst>
   </p:cSld>
@@ -337,7 +337,7 @@
               <a:rPr lang="es-ES" smtClean="0"/>
               <a:t>Haga clic para modificar el estilo de título del patrón</a:t>
             </a:r>
-            <a:endParaRPr lang="en-US"/>
+            <a:endParaRPr lang="es-ES"/>
           </a:p>
         </p:txBody>
       </p:sp>
@@ -389,7 +389,7 @@
               <a:rPr lang="es-ES" smtClean="0"/>
               <a:t>Quinto nivel</a:t>
             </a:r>
-            <a:endParaRPr lang="en-US"/>
+            <a:endParaRPr lang="es-ES"/>
           </a:p>
         </p:txBody>
       </p:sp>
@@ -408,11 +408,11 @@
           <a:bodyPr/>
           <a:lstStyle/>
           <a:p>
-            <a:fld id="{87C21B04-3BFD-4195-953B-842DE72845A9}" type="datetimeFigureOut">
-              <a:rPr lang="en-US" smtClean="0"/>
-              <a:t>8/20/2018</a:t>
+            <a:fld id="{CB7C35F1-2967-47B1-ABA0-D6ECBDD2FDCA}" type="datetimeFigureOut">
+              <a:rPr lang="es-ES" smtClean="0"/>
+              <a:t>06/08/2018</a:t>
             </a:fld>
-            <a:endParaRPr lang="en-US"/>
+            <a:endParaRPr lang="es-ES"/>
           </a:p>
         </p:txBody>
       </p:sp>
@@ -431,7 +431,7 @@
           <a:bodyPr/>
           <a:lstStyle/>
           <a:p>
-            <a:endParaRPr lang="en-US"/>
+            <a:endParaRPr lang="es-ES"/>
           </a:p>
         </p:txBody>
       </p:sp>
@@ -450,18 +450,18 @@
           <a:bodyPr/>
           <a:lstStyle/>
           <a:p>
-            <a:fld id="{282D6D79-DA7E-4C38-B43B-8F3E90E82397}" type="slidenum">
-              <a:rPr lang="en-US" smtClean="0"/>
+            <a:fld id="{2AC86D11-95AB-4D54-A55D-3E4BE70CA48F}" type="slidenum">
+              <a:rPr lang="es-ES" smtClean="0"/>
               <a:t>‹Nº›</a:t>
             </a:fld>
-            <a:endParaRPr lang="en-US"/>
+            <a:endParaRPr lang="es-ES"/>
           </a:p>
         </p:txBody>
       </p:sp>
     </p:spTree>
     <p:extLst>
       <p:ext uri="{BB962C8B-B14F-4D97-AF65-F5344CB8AC3E}">
-        <p14:creationId xmlns:p14="http://schemas.microsoft.com/office/powerpoint/2010/main" val="3090923053"/>
+        <p14:creationId xmlns:p14="http://schemas.microsoft.com/office/powerpoint/2010/main" val="4272878317"/>
       </p:ext>
     </p:extLst>
   </p:cSld>
@@ -512,7 +512,7 @@
               <a:rPr lang="es-ES" smtClean="0"/>
               <a:t>Haga clic para modificar el estilo de título del patrón</a:t>
             </a:r>
-            <a:endParaRPr lang="en-US"/>
+            <a:endParaRPr lang="es-ES"/>
           </a:p>
         </p:txBody>
       </p:sp>
@@ -569,7 +569,7 @@
               <a:rPr lang="es-ES" smtClean="0"/>
               <a:t>Quinto nivel</a:t>
             </a:r>
-            <a:endParaRPr lang="en-US"/>
+            <a:endParaRPr lang="es-ES"/>
           </a:p>
         </p:txBody>
       </p:sp>
@@ -588,11 +588,11 @@
           <a:bodyPr/>
           <a:lstStyle/>
           <a:p>
-            <a:fld id="{87C21B04-3BFD-4195-953B-842DE72845A9}" type="datetimeFigureOut">
-              <a:rPr lang="en-US" smtClean="0"/>
-              <a:t>8/20/2018</a:t>
+            <a:fld id="{CB7C35F1-2967-47B1-ABA0-D6ECBDD2FDCA}" type="datetimeFigureOut">
+              <a:rPr lang="es-ES" smtClean="0"/>
+              <a:t>06/08/2018</a:t>
             </a:fld>
-            <a:endParaRPr lang="en-US"/>
+            <a:endParaRPr lang="es-ES"/>
           </a:p>
         </p:txBody>
       </p:sp>
@@ -611,7 +611,7 @@
           <a:bodyPr/>
           <a:lstStyle/>
           <a:p>
-            <a:endParaRPr lang="en-US"/>
+            <a:endParaRPr lang="es-ES"/>
           </a:p>
         </p:txBody>
       </p:sp>
@@ -630,18 +630,18 @@
           <a:bodyPr/>
           <a:lstStyle/>
           <a:p>
-            <a:fld id="{282D6D79-DA7E-4C38-B43B-8F3E90E82397}" type="slidenum">
-              <a:rPr lang="en-US" smtClean="0"/>
+            <a:fld id="{2AC86D11-95AB-4D54-A55D-3E4BE70CA48F}" type="slidenum">
+              <a:rPr lang="es-ES" smtClean="0"/>
               <a:t>‹Nº›</a:t>
             </a:fld>
-            <a:endParaRPr lang="en-US"/>
+            <a:endParaRPr lang="es-ES"/>
           </a:p>
         </p:txBody>
       </p:sp>
     </p:spTree>
     <p:extLst>
       <p:ext uri="{BB962C8B-B14F-4D97-AF65-F5344CB8AC3E}">
-        <p14:creationId xmlns:p14="http://schemas.microsoft.com/office/powerpoint/2010/main" val="4173914836"/>
+        <p14:creationId xmlns:p14="http://schemas.microsoft.com/office/powerpoint/2010/main" val="1394968067"/>
       </p:ext>
     </p:extLst>
   </p:cSld>
@@ -687,7 +687,7 @@
               <a:rPr lang="es-ES" smtClean="0"/>
               <a:t>Haga clic para modificar el estilo de título del patrón</a:t>
             </a:r>
-            <a:endParaRPr lang="en-US"/>
+            <a:endParaRPr lang="es-ES"/>
           </a:p>
         </p:txBody>
       </p:sp>
@@ -739,7 +739,7 @@
               <a:rPr lang="es-ES" smtClean="0"/>
               <a:t>Quinto nivel</a:t>
             </a:r>
-            <a:endParaRPr lang="en-US"/>
+            <a:endParaRPr lang="es-ES"/>
           </a:p>
         </p:txBody>
       </p:sp>
@@ -758,11 +758,11 @@
           <a:bodyPr/>
           <a:lstStyle/>
           <a:p>
-            <a:fld id="{87C21B04-3BFD-4195-953B-842DE72845A9}" type="datetimeFigureOut">
-              <a:rPr lang="en-US" smtClean="0"/>
-              <a:t>8/20/2018</a:t>
+            <a:fld id="{CB7C35F1-2967-47B1-ABA0-D6ECBDD2FDCA}" type="datetimeFigureOut">
+              <a:rPr lang="es-ES" smtClean="0"/>
+              <a:t>06/08/2018</a:t>
             </a:fld>
-            <a:endParaRPr lang="en-US"/>
+            <a:endParaRPr lang="es-ES"/>
           </a:p>
         </p:txBody>
       </p:sp>
@@ -781,7 +781,7 @@
           <a:bodyPr/>
           <a:lstStyle/>
           <a:p>
-            <a:endParaRPr lang="en-US"/>
+            <a:endParaRPr lang="es-ES"/>
           </a:p>
         </p:txBody>
       </p:sp>
@@ -800,18 +800,18 @@
           <a:bodyPr/>
           <a:lstStyle/>
           <a:p>
-            <a:fld id="{282D6D79-DA7E-4C38-B43B-8F3E90E82397}" type="slidenum">
-              <a:rPr lang="en-US" smtClean="0"/>
+            <a:fld id="{2AC86D11-95AB-4D54-A55D-3E4BE70CA48F}" type="slidenum">
+              <a:rPr lang="es-ES" smtClean="0"/>
               <a:t>‹Nº›</a:t>
             </a:fld>
-            <a:endParaRPr lang="en-US"/>
+            <a:endParaRPr lang="es-ES"/>
           </a:p>
         </p:txBody>
       </p:sp>
     </p:spTree>
     <p:extLst>
       <p:ext uri="{BB962C8B-B14F-4D97-AF65-F5344CB8AC3E}">
-        <p14:creationId xmlns:p14="http://schemas.microsoft.com/office/powerpoint/2010/main" val="2085084184"/>
+        <p14:creationId xmlns:p14="http://schemas.microsoft.com/office/powerpoint/2010/main" val="673281061"/>
       </p:ext>
     </p:extLst>
   </p:cSld>
@@ -866,7 +866,7 @@
               <a:rPr lang="es-ES" smtClean="0"/>
               <a:t>Haga clic para modificar el estilo de título del patrón</a:t>
             </a:r>
-            <a:endParaRPr lang="en-US"/>
+            <a:endParaRPr lang="es-ES"/>
           </a:p>
         </p:txBody>
       </p:sp>
@@ -1004,11 +1004,11 @@
           <a:bodyPr/>
           <a:lstStyle/>
           <a:p>
-            <a:fld id="{87C21B04-3BFD-4195-953B-842DE72845A9}" type="datetimeFigureOut">
-              <a:rPr lang="en-US" smtClean="0"/>
-              <a:t>8/20/2018</a:t>
+            <a:fld id="{CB7C35F1-2967-47B1-ABA0-D6ECBDD2FDCA}" type="datetimeFigureOut">
+              <a:rPr lang="es-ES" smtClean="0"/>
+              <a:t>06/08/2018</a:t>
             </a:fld>
-            <a:endParaRPr lang="en-US"/>
+            <a:endParaRPr lang="es-ES"/>
           </a:p>
         </p:txBody>
       </p:sp>
@@ -1027,7 +1027,7 @@
           <a:bodyPr/>
           <a:lstStyle/>
           <a:p>
-            <a:endParaRPr lang="en-US"/>
+            <a:endParaRPr lang="es-ES"/>
           </a:p>
         </p:txBody>
       </p:sp>
@@ -1046,18 +1046,18 @@
           <a:bodyPr/>
           <a:lstStyle/>
           <a:p>
-            <a:fld id="{282D6D79-DA7E-4C38-B43B-8F3E90E82397}" type="slidenum">
-              <a:rPr lang="en-US" smtClean="0"/>
+            <a:fld id="{2AC86D11-95AB-4D54-A55D-3E4BE70CA48F}" type="slidenum">
+              <a:rPr lang="es-ES" smtClean="0"/>
               <a:t>‹Nº›</a:t>
             </a:fld>
-            <a:endParaRPr lang="en-US"/>
+            <a:endParaRPr lang="es-ES"/>
           </a:p>
         </p:txBody>
       </p:sp>
     </p:spTree>
     <p:extLst>
       <p:ext uri="{BB962C8B-B14F-4D97-AF65-F5344CB8AC3E}">
-        <p14:creationId xmlns:p14="http://schemas.microsoft.com/office/powerpoint/2010/main" val="2511605569"/>
+        <p14:creationId xmlns:p14="http://schemas.microsoft.com/office/powerpoint/2010/main" val="793594111"/>
       </p:ext>
     </p:extLst>
   </p:cSld>
@@ -1103,7 +1103,7 @@
               <a:rPr lang="es-ES" smtClean="0"/>
               <a:t>Haga clic para modificar el estilo de título del patrón</a:t>
             </a:r>
-            <a:endParaRPr lang="en-US"/>
+            <a:endParaRPr lang="es-ES"/>
           </a:p>
         </p:txBody>
       </p:sp>
@@ -1160,7 +1160,7 @@
               <a:rPr lang="es-ES" smtClean="0"/>
               <a:t>Quinto nivel</a:t>
             </a:r>
-            <a:endParaRPr lang="en-US"/>
+            <a:endParaRPr lang="es-ES"/>
           </a:p>
         </p:txBody>
       </p:sp>
@@ -1217,7 +1217,7 @@
               <a:rPr lang="es-ES" smtClean="0"/>
               <a:t>Quinto nivel</a:t>
             </a:r>
-            <a:endParaRPr lang="en-US"/>
+            <a:endParaRPr lang="es-ES"/>
           </a:p>
         </p:txBody>
       </p:sp>
@@ -1236,11 +1236,11 @@
           <a:bodyPr/>
           <a:lstStyle/>
           <a:p>
-            <a:fld id="{87C21B04-3BFD-4195-953B-842DE72845A9}" type="datetimeFigureOut">
-              <a:rPr lang="en-US" smtClean="0"/>
-              <a:t>8/20/2018</a:t>
+            <a:fld id="{CB7C35F1-2967-47B1-ABA0-D6ECBDD2FDCA}" type="datetimeFigureOut">
+              <a:rPr lang="es-ES" smtClean="0"/>
+              <a:t>06/08/2018</a:t>
             </a:fld>
-            <a:endParaRPr lang="en-US"/>
+            <a:endParaRPr lang="es-ES"/>
           </a:p>
         </p:txBody>
       </p:sp>
@@ -1259,7 +1259,7 @@
           <a:bodyPr/>
           <a:lstStyle/>
           <a:p>
-            <a:endParaRPr lang="en-US"/>
+            <a:endParaRPr lang="es-ES"/>
           </a:p>
         </p:txBody>
       </p:sp>
@@ -1278,18 +1278,18 @@
           <a:bodyPr/>
           <a:lstStyle/>
           <a:p>
-            <a:fld id="{282D6D79-DA7E-4C38-B43B-8F3E90E82397}" type="slidenum">
-              <a:rPr lang="en-US" smtClean="0"/>
+            <a:fld id="{2AC86D11-95AB-4D54-A55D-3E4BE70CA48F}" type="slidenum">
+              <a:rPr lang="es-ES" smtClean="0"/>
               <a:t>‹Nº›</a:t>
             </a:fld>
-            <a:endParaRPr lang="en-US"/>
+            <a:endParaRPr lang="es-ES"/>
           </a:p>
         </p:txBody>
       </p:sp>
     </p:spTree>
     <p:extLst>
       <p:ext uri="{BB962C8B-B14F-4D97-AF65-F5344CB8AC3E}">
-        <p14:creationId xmlns:p14="http://schemas.microsoft.com/office/powerpoint/2010/main" val="1710506630"/>
+        <p14:creationId xmlns:p14="http://schemas.microsoft.com/office/powerpoint/2010/main" val="129620926"/>
       </p:ext>
     </p:extLst>
   </p:cSld>
@@ -1340,7 +1340,7 @@
               <a:rPr lang="es-ES" smtClean="0"/>
               <a:t>Haga clic para modificar el estilo de título del patrón</a:t>
             </a:r>
-            <a:endParaRPr lang="en-US"/>
+            <a:endParaRPr lang="es-ES"/>
           </a:p>
         </p:txBody>
       </p:sp>
@@ -1462,7 +1462,7 @@
               <a:rPr lang="es-ES" smtClean="0"/>
               <a:t>Quinto nivel</a:t>
             </a:r>
-            <a:endParaRPr lang="en-US"/>
+            <a:endParaRPr lang="es-ES"/>
           </a:p>
         </p:txBody>
       </p:sp>
@@ -1584,7 +1584,7 @@
               <a:rPr lang="es-ES" smtClean="0"/>
               <a:t>Quinto nivel</a:t>
             </a:r>
-            <a:endParaRPr lang="en-US"/>
+            <a:endParaRPr lang="es-ES"/>
           </a:p>
         </p:txBody>
       </p:sp>
@@ -1603,11 +1603,11 @@
           <a:bodyPr/>
           <a:lstStyle/>
           <a:p>
-            <a:fld id="{87C21B04-3BFD-4195-953B-842DE72845A9}" type="datetimeFigureOut">
-              <a:rPr lang="en-US" smtClean="0"/>
-              <a:t>8/20/2018</a:t>
+            <a:fld id="{CB7C35F1-2967-47B1-ABA0-D6ECBDD2FDCA}" type="datetimeFigureOut">
+              <a:rPr lang="es-ES" smtClean="0"/>
+              <a:t>06/08/2018</a:t>
             </a:fld>
-            <a:endParaRPr lang="en-US"/>
+            <a:endParaRPr lang="es-ES"/>
           </a:p>
         </p:txBody>
       </p:sp>
@@ -1626,7 +1626,7 @@
           <a:bodyPr/>
           <a:lstStyle/>
           <a:p>
-            <a:endParaRPr lang="en-US"/>
+            <a:endParaRPr lang="es-ES"/>
           </a:p>
         </p:txBody>
       </p:sp>
@@ -1645,18 +1645,18 @@
           <a:bodyPr/>
           <a:lstStyle/>
           <a:p>
-            <a:fld id="{282D6D79-DA7E-4C38-B43B-8F3E90E82397}" type="slidenum">
-              <a:rPr lang="en-US" smtClean="0"/>
+            <a:fld id="{2AC86D11-95AB-4D54-A55D-3E4BE70CA48F}" type="slidenum">
+              <a:rPr lang="es-ES" smtClean="0"/>
               <a:t>‹Nº›</a:t>
             </a:fld>
-            <a:endParaRPr lang="en-US"/>
+            <a:endParaRPr lang="es-ES"/>
           </a:p>
         </p:txBody>
       </p:sp>
     </p:spTree>
     <p:extLst>
       <p:ext uri="{BB962C8B-B14F-4D97-AF65-F5344CB8AC3E}">
-        <p14:creationId xmlns:p14="http://schemas.microsoft.com/office/powerpoint/2010/main" val="2819241074"/>
+        <p14:creationId xmlns:p14="http://schemas.microsoft.com/office/powerpoint/2010/main" val="2581025708"/>
       </p:ext>
     </p:extLst>
   </p:cSld>
@@ -1702,7 +1702,7 @@
               <a:rPr lang="es-ES" smtClean="0"/>
               <a:t>Haga clic para modificar el estilo de título del patrón</a:t>
             </a:r>
-            <a:endParaRPr lang="en-US"/>
+            <a:endParaRPr lang="es-ES"/>
           </a:p>
         </p:txBody>
       </p:sp>
@@ -1721,11 +1721,11 @@
           <a:bodyPr/>
           <a:lstStyle/>
           <a:p>
-            <a:fld id="{87C21B04-3BFD-4195-953B-842DE72845A9}" type="datetimeFigureOut">
-              <a:rPr lang="en-US" smtClean="0"/>
-              <a:t>8/20/2018</a:t>
+            <a:fld id="{CB7C35F1-2967-47B1-ABA0-D6ECBDD2FDCA}" type="datetimeFigureOut">
+              <a:rPr lang="es-ES" smtClean="0"/>
+              <a:t>06/08/2018</a:t>
             </a:fld>
-            <a:endParaRPr lang="en-US"/>
+            <a:endParaRPr lang="es-ES"/>
           </a:p>
         </p:txBody>
       </p:sp>
@@ -1744,7 +1744,7 @@
           <a:bodyPr/>
           <a:lstStyle/>
           <a:p>
-            <a:endParaRPr lang="en-US"/>
+            <a:endParaRPr lang="es-ES"/>
           </a:p>
         </p:txBody>
       </p:sp>
@@ -1763,18 +1763,18 @@
           <a:bodyPr/>
           <a:lstStyle/>
           <a:p>
-            <a:fld id="{282D6D79-DA7E-4C38-B43B-8F3E90E82397}" type="slidenum">
-              <a:rPr lang="en-US" smtClean="0"/>
+            <a:fld id="{2AC86D11-95AB-4D54-A55D-3E4BE70CA48F}" type="slidenum">
+              <a:rPr lang="es-ES" smtClean="0"/>
               <a:t>‹Nº›</a:t>
             </a:fld>
-            <a:endParaRPr lang="en-US"/>
+            <a:endParaRPr lang="es-ES"/>
           </a:p>
         </p:txBody>
       </p:sp>
     </p:spTree>
     <p:extLst>
       <p:ext uri="{BB962C8B-B14F-4D97-AF65-F5344CB8AC3E}">
-        <p14:creationId xmlns:p14="http://schemas.microsoft.com/office/powerpoint/2010/main" val="2492004053"/>
+        <p14:creationId xmlns:p14="http://schemas.microsoft.com/office/powerpoint/2010/main" val="2516054566"/>
       </p:ext>
     </p:extLst>
   </p:cSld>
@@ -1816,11 +1816,11 @@
           <a:bodyPr/>
           <a:lstStyle/>
           <a:p>
-            <a:fld id="{87C21B04-3BFD-4195-953B-842DE72845A9}" type="datetimeFigureOut">
-              <a:rPr lang="en-US" smtClean="0"/>
-              <a:t>8/20/2018</a:t>
+            <a:fld id="{CB7C35F1-2967-47B1-ABA0-D6ECBDD2FDCA}" type="datetimeFigureOut">
+              <a:rPr lang="es-ES" smtClean="0"/>
+              <a:t>06/08/2018</a:t>
             </a:fld>
-            <a:endParaRPr lang="en-US"/>
+            <a:endParaRPr lang="es-ES"/>
           </a:p>
         </p:txBody>
       </p:sp>
@@ -1839,7 +1839,7 @@
           <a:bodyPr/>
           <a:lstStyle/>
           <a:p>
-            <a:endParaRPr lang="en-US"/>
+            <a:endParaRPr lang="es-ES"/>
           </a:p>
         </p:txBody>
       </p:sp>
@@ -1858,18 +1858,18 @@
           <a:bodyPr/>
           <a:lstStyle/>
           <a:p>
-            <a:fld id="{282D6D79-DA7E-4C38-B43B-8F3E90E82397}" type="slidenum">
-              <a:rPr lang="en-US" smtClean="0"/>
+            <a:fld id="{2AC86D11-95AB-4D54-A55D-3E4BE70CA48F}" type="slidenum">
+              <a:rPr lang="es-ES" smtClean="0"/>
               <a:t>‹Nº›</a:t>
             </a:fld>
-            <a:endParaRPr lang="en-US"/>
+            <a:endParaRPr lang="es-ES"/>
           </a:p>
         </p:txBody>
       </p:sp>
     </p:spTree>
     <p:extLst>
       <p:ext uri="{BB962C8B-B14F-4D97-AF65-F5344CB8AC3E}">
-        <p14:creationId xmlns:p14="http://schemas.microsoft.com/office/powerpoint/2010/main" val="3527145557"/>
+        <p14:creationId xmlns:p14="http://schemas.microsoft.com/office/powerpoint/2010/main" val="1877712458"/>
       </p:ext>
     </p:extLst>
   </p:cSld>
@@ -1924,7 +1924,7 @@
               <a:rPr lang="es-ES" smtClean="0"/>
               <a:t>Haga clic para modificar el estilo de título del patrón</a:t>
             </a:r>
-            <a:endParaRPr lang="en-US"/>
+            <a:endParaRPr lang="es-ES"/>
           </a:p>
         </p:txBody>
       </p:sp>
@@ -2009,7 +2009,7 @@
               <a:rPr lang="es-ES" smtClean="0"/>
               <a:t>Quinto nivel</a:t>
             </a:r>
-            <a:endParaRPr lang="en-US"/>
+            <a:endParaRPr lang="es-ES"/>
           </a:p>
         </p:txBody>
       </p:sp>
@@ -2093,11 +2093,11 @@
           <a:bodyPr/>
           <a:lstStyle/>
           <a:p>
-            <a:fld id="{87C21B04-3BFD-4195-953B-842DE72845A9}" type="datetimeFigureOut">
-              <a:rPr lang="en-US" smtClean="0"/>
-              <a:t>8/20/2018</a:t>
+            <a:fld id="{CB7C35F1-2967-47B1-ABA0-D6ECBDD2FDCA}" type="datetimeFigureOut">
+              <a:rPr lang="es-ES" smtClean="0"/>
+              <a:t>06/08/2018</a:t>
             </a:fld>
-            <a:endParaRPr lang="en-US"/>
+            <a:endParaRPr lang="es-ES"/>
           </a:p>
         </p:txBody>
       </p:sp>
@@ -2116,7 +2116,7 @@
           <a:bodyPr/>
           <a:lstStyle/>
           <a:p>
-            <a:endParaRPr lang="en-US"/>
+            <a:endParaRPr lang="es-ES"/>
           </a:p>
         </p:txBody>
       </p:sp>
@@ -2135,18 +2135,18 @@
           <a:bodyPr/>
           <a:lstStyle/>
           <a:p>
-            <a:fld id="{282D6D79-DA7E-4C38-B43B-8F3E90E82397}" type="slidenum">
-              <a:rPr lang="en-US" smtClean="0"/>
+            <a:fld id="{2AC86D11-95AB-4D54-A55D-3E4BE70CA48F}" type="slidenum">
+              <a:rPr lang="es-ES" smtClean="0"/>
               <a:t>‹Nº›</a:t>
             </a:fld>
-            <a:endParaRPr lang="en-US"/>
+            <a:endParaRPr lang="es-ES"/>
           </a:p>
         </p:txBody>
       </p:sp>
     </p:spTree>
     <p:extLst>
       <p:ext uri="{BB962C8B-B14F-4D97-AF65-F5344CB8AC3E}">
-        <p14:creationId xmlns:p14="http://schemas.microsoft.com/office/powerpoint/2010/main" val="4258965092"/>
+        <p14:creationId xmlns:p14="http://schemas.microsoft.com/office/powerpoint/2010/main" val="2814506958"/>
       </p:ext>
     </p:extLst>
   </p:cSld>
@@ -2201,7 +2201,7 @@
               <a:rPr lang="es-ES" smtClean="0"/>
               <a:t>Haga clic para modificar el estilo de título del patrón</a:t>
             </a:r>
-            <a:endParaRPr lang="en-US"/>
+            <a:endParaRPr lang="es-ES"/>
           </a:p>
         </p:txBody>
       </p:sp>
@@ -2262,7 +2262,7 @@
             </a:lvl9pPr>
           </a:lstStyle>
           <a:p>
-            <a:endParaRPr lang="en-US"/>
+            <a:endParaRPr lang="es-ES"/>
           </a:p>
         </p:txBody>
       </p:sp>
@@ -2346,11 +2346,11 @@
           <a:bodyPr/>
           <a:lstStyle/>
           <a:p>
-            <a:fld id="{87C21B04-3BFD-4195-953B-842DE72845A9}" type="datetimeFigureOut">
-              <a:rPr lang="en-US" smtClean="0"/>
-              <a:t>8/20/2018</a:t>
+            <a:fld id="{CB7C35F1-2967-47B1-ABA0-D6ECBDD2FDCA}" type="datetimeFigureOut">
+              <a:rPr lang="es-ES" smtClean="0"/>
+              <a:t>06/08/2018</a:t>
             </a:fld>
-            <a:endParaRPr lang="en-US"/>
+            <a:endParaRPr lang="es-ES"/>
           </a:p>
         </p:txBody>
       </p:sp>
@@ -2369,7 +2369,7 @@
           <a:bodyPr/>
           <a:lstStyle/>
           <a:p>
-            <a:endParaRPr lang="en-US"/>
+            <a:endParaRPr lang="es-ES"/>
           </a:p>
         </p:txBody>
       </p:sp>
@@ -2388,18 +2388,18 @@
           <a:bodyPr/>
           <a:lstStyle/>
           <a:p>
-            <a:fld id="{282D6D79-DA7E-4C38-B43B-8F3E90E82397}" type="slidenum">
-              <a:rPr lang="en-US" smtClean="0"/>
+            <a:fld id="{2AC86D11-95AB-4D54-A55D-3E4BE70CA48F}" type="slidenum">
+              <a:rPr lang="es-ES" smtClean="0"/>
               <a:t>‹Nº›</a:t>
             </a:fld>
-            <a:endParaRPr lang="en-US"/>
+            <a:endParaRPr lang="es-ES"/>
           </a:p>
         </p:txBody>
       </p:sp>
     </p:spTree>
     <p:extLst>
       <p:ext uri="{BB962C8B-B14F-4D97-AF65-F5344CB8AC3E}">
-        <p14:creationId xmlns:p14="http://schemas.microsoft.com/office/powerpoint/2010/main" val="875962881"/>
+        <p14:creationId xmlns:p14="http://schemas.microsoft.com/office/powerpoint/2010/main" val="2857179246"/>
       </p:ext>
     </p:extLst>
   </p:cSld>
@@ -2460,7 +2460,7 @@
               <a:rPr lang="es-ES" smtClean="0"/>
               <a:t>Haga clic para modificar el estilo de título del patrón</a:t>
             </a:r>
-            <a:endParaRPr lang="en-US"/>
+            <a:endParaRPr lang="es-ES"/>
           </a:p>
         </p:txBody>
       </p:sp>
@@ -2522,7 +2522,7 @@
               <a:rPr lang="es-ES" smtClean="0"/>
               <a:t>Quinto nivel</a:t>
             </a:r>
-            <a:endParaRPr lang="en-US"/>
+            <a:endParaRPr lang="es-ES"/>
           </a:p>
         </p:txBody>
       </p:sp>
@@ -2559,11 +2559,11 @@
             </a:lvl1pPr>
           </a:lstStyle>
           <a:p>
-            <a:fld id="{87C21B04-3BFD-4195-953B-842DE72845A9}" type="datetimeFigureOut">
-              <a:rPr lang="en-US" smtClean="0"/>
-              <a:t>8/20/2018</a:t>
+            <a:fld id="{CB7C35F1-2967-47B1-ABA0-D6ECBDD2FDCA}" type="datetimeFigureOut">
+              <a:rPr lang="es-ES" smtClean="0"/>
+              <a:t>06/08/2018</a:t>
             </a:fld>
-            <a:endParaRPr lang="en-US"/>
+            <a:endParaRPr lang="es-ES"/>
           </a:p>
         </p:txBody>
       </p:sp>
@@ -2600,7 +2600,7 @@
             </a:lvl1pPr>
           </a:lstStyle>
           <a:p>
-            <a:endParaRPr lang="en-US"/>
+            <a:endParaRPr lang="es-ES"/>
           </a:p>
         </p:txBody>
       </p:sp>
@@ -2637,18 +2637,18 @@
             </a:lvl1pPr>
           </a:lstStyle>
           <a:p>
-            <a:fld id="{282D6D79-DA7E-4C38-B43B-8F3E90E82397}" type="slidenum">
-              <a:rPr lang="en-US" smtClean="0"/>
+            <a:fld id="{2AC86D11-95AB-4D54-A55D-3E4BE70CA48F}" type="slidenum">
+              <a:rPr lang="es-ES" smtClean="0"/>
               <a:t>‹Nº›</a:t>
             </a:fld>
-            <a:endParaRPr lang="en-US"/>
+            <a:endParaRPr lang="es-ES"/>
           </a:p>
         </p:txBody>
       </p:sp>
     </p:spTree>
     <p:extLst>
       <p:ext uri="{BB962C8B-B14F-4D97-AF65-F5344CB8AC3E}">
-        <p14:creationId xmlns:p14="http://schemas.microsoft.com/office/powerpoint/2010/main" val="920138128"/>
+        <p14:creationId xmlns:p14="http://schemas.microsoft.com/office/powerpoint/2010/main" val="464177610"/>
       </p:ext>
     </p:extLst>
   </p:cSld>
@@ -2852,7 +2852,7 @@
     </p:bodyStyle>
     <p:otherStyle>
       <a:defPPr>
-        <a:defRPr lang="en-US"/>
+        <a:defRPr lang="es-ES"/>
       </a:defPPr>
       <a:lvl1pPr marL="0" algn="l" defTabSz="914400" rtl="0" eaLnBrk="1" latinLnBrk="0" hangingPunct="1">
         <a:defRPr sz="1800" kern="1200">
@@ -2952,6 +2952,184 @@
 <file path=ppt/slides/slide1.xml><?xml version="1.0" encoding="utf-8"?>
 <p:sld xmlns:a="http://schemas.openxmlformats.org/drawingml/2006/main" xmlns:r="http://schemas.openxmlformats.org/officeDocument/2006/relationships" xmlns:p="http://schemas.openxmlformats.org/presentationml/2006/main">
   <p:cSld>
+    <p:bg>
+      <p:bgPr>
+        <a:solidFill>
+          <a:schemeClr val="bg2">
+            <a:lumMod val="75000"/>
+          </a:schemeClr>
+        </a:solidFill>
+        <a:effectLst/>
+      </p:bgPr>
+    </p:bg>
+    <p:spTree>
+      <p:nvGrpSpPr>
+        <p:cNvPr id="1" name=""/>
+        <p:cNvGrpSpPr/>
+        <p:nvPr/>
+      </p:nvGrpSpPr>
+      <p:grpSpPr>
+        <a:xfrm>
+          <a:off x="0" y="0"/>
+          <a:ext cx="0" cy="0"/>
+          <a:chOff x="0" y="0"/>
+          <a:chExt cx="0" cy="0"/>
+        </a:xfrm>
+      </p:grpSpPr>
+      <p:sp>
+        <p:nvSpPr>
+          <p:cNvPr id="2" name="Título 1"/>
+          <p:cNvSpPr>
+            <a:spLocks noGrp="1"/>
+          </p:cNvSpPr>
+          <p:nvPr>
+            <p:ph type="ctrTitle"/>
+          </p:nvPr>
+        </p:nvSpPr>
+        <p:spPr/>
+        <p:txBody>
+          <a:bodyPr/>
+          <a:lstStyle/>
+          <a:p>
+            <a:endParaRPr lang="es-ES" dirty="0"/>
+          </a:p>
+        </p:txBody>
+      </p:sp>
+      <p:sp>
+        <p:nvSpPr>
+          <p:cNvPr id="3" name="Subtítulo 2"/>
+          <p:cNvSpPr>
+            <a:spLocks noGrp="1"/>
+          </p:cNvSpPr>
+          <p:nvPr>
+            <p:ph type="subTitle" idx="1"/>
+          </p:nvPr>
+        </p:nvSpPr>
+        <p:spPr/>
+        <p:txBody>
+          <a:bodyPr/>
+          <a:lstStyle/>
+          <a:p>
+            <a:endParaRPr lang="es-ES"/>
+          </a:p>
+        </p:txBody>
+      </p:sp>
+      <p:pic>
+        <p:nvPicPr>
+          <p:cNvPr id="4" name="Imagen 3"/>
+          <p:cNvPicPr>
+            <a:picLocks noChangeAspect="1"/>
+          </p:cNvPicPr>
+          <p:nvPr/>
+        </p:nvPicPr>
+        <p:blipFill>
+          <a:blip r:embed="rId2">
+            <a:extLst>
+              <a:ext uri="{28A0092B-C50C-407E-A947-70E740481C1C}">
+                <a14:useLocalDpi xmlns:a14="http://schemas.microsoft.com/office/drawing/2010/main" val="0"/>
+              </a:ext>
+            </a:extLst>
+          </a:blip>
+          <a:stretch>
+            <a:fillRect/>
+          </a:stretch>
+        </p:blipFill>
+        <p:spPr>
+          <a:xfrm>
+            <a:off x="620202" y="540689"/>
+            <a:ext cx="3658901" cy="5603143"/>
+          </a:xfrm>
+          <a:prstGeom prst="rect">
+            <a:avLst/>
+          </a:prstGeom>
+        </p:spPr>
+      </p:pic>
+      <p:pic>
+        <p:nvPicPr>
+          <p:cNvPr id="5" name="Imagen 4"/>
+          <p:cNvPicPr>
+            <a:picLocks noChangeAspect="1"/>
+          </p:cNvPicPr>
+          <p:nvPr/>
+        </p:nvPicPr>
+        <p:blipFill>
+          <a:blip r:embed="rId3">
+            <a:extLst>
+              <a:ext uri="{28A0092B-C50C-407E-A947-70E740481C1C}">
+                <a14:useLocalDpi xmlns:a14="http://schemas.microsoft.com/office/drawing/2010/main" val="0"/>
+              </a:ext>
+            </a:extLst>
+          </a:blip>
+          <a:stretch>
+            <a:fillRect/>
+          </a:stretch>
+        </p:blipFill>
+        <p:spPr>
+          <a:xfrm>
+            <a:off x="8024689" y="540689"/>
+            <a:ext cx="3441092" cy="5603143"/>
+          </a:xfrm>
+          <a:prstGeom prst="rect">
+            <a:avLst/>
+          </a:prstGeom>
+        </p:spPr>
+      </p:pic>
+      <p:pic>
+        <p:nvPicPr>
+          <p:cNvPr id="6" name="Imagen 5"/>
+          <p:cNvPicPr>
+            <a:picLocks noChangeAspect="1"/>
+          </p:cNvPicPr>
+          <p:nvPr/>
+        </p:nvPicPr>
+        <p:blipFill>
+          <a:blip r:embed="rId4" cstate="print">
+            <a:extLst>
+              <a:ext uri="{28A0092B-C50C-407E-A947-70E740481C1C}">
+                <a14:useLocalDpi xmlns:a14="http://schemas.microsoft.com/office/drawing/2010/main" val="0"/>
+              </a:ext>
+            </a:extLst>
+          </a:blip>
+          <a:stretch>
+            <a:fillRect/>
+          </a:stretch>
+        </p:blipFill>
+        <p:spPr>
+          <a:xfrm rot="5400000">
+            <a:off x="3335917" y="1657505"/>
+            <a:ext cx="5620885" cy="3387259"/>
+          </a:xfrm>
+          <a:prstGeom prst="rect">
+            <a:avLst/>
+          </a:prstGeom>
+        </p:spPr>
+      </p:pic>
+    </p:spTree>
+    <p:extLst>
+      <p:ext uri="{BB962C8B-B14F-4D97-AF65-F5344CB8AC3E}">
+        <p14:creationId xmlns:p14="http://schemas.microsoft.com/office/powerpoint/2010/main" val="1181332899"/>
+      </p:ext>
+    </p:extLst>
+  </p:cSld>
+  <p:clrMapOvr>
+    <a:masterClrMapping/>
+  </p:clrMapOvr>
+</p:sld>
+</file>
+
+<file path=ppt/slides/slide2.xml><?xml version="1.0" encoding="utf-8"?>
+<p:sld xmlns:a="http://schemas.openxmlformats.org/drawingml/2006/main" xmlns:r="http://schemas.openxmlformats.org/officeDocument/2006/relationships" xmlns:p="http://schemas.openxmlformats.org/presentationml/2006/main">
+  <p:cSld>
+    <p:bg>
+      <p:bgPr>
+        <a:solidFill>
+          <a:schemeClr val="bg2">
+            <a:lumMod val="75000"/>
+          </a:schemeClr>
+        </a:solidFill>
+        <a:effectLst/>
+      </p:bgPr>
+    </p:bg>
     <p:spTree>
       <p:nvGrpSpPr>
         <p:cNvPr id="1" name=""/>
@@ -2968,44 +3146,38 @@
       </p:grpSpPr>
       <p:pic>
         <p:nvPicPr>
-          <p:cNvPr id="7" name="Imagen 6"/>
+          <p:cNvPr id="5" name="Imagen 4"/>
           <p:cNvPicPr>
             <a:picLocks noChangeAspect="1"/>
           </p:cNvPicPr>
           <p:nvPr/>
         </p:nvPicPr>
         <p:blipFill>
-          <a:blip r:embed="rId2"/>
+          <a:blip r:embed="rId2">
+            <a:extLst>
+              <a:ext uri="{28A0092B-C50C-407E-A947-70E740481C1C}">
+                <a14:useLocalDpi xmlns:a14="http://schemas.microsoft.com/office/drawing/2010/main" val="0"/>
+              </a:ext>
+            </a:extLst>
+          </a:blip>
           <a:stretch>
             <a:fillRect/>
           </a:stretch>
         </p:blipFill>
         <p:spPr>
           <a:xfrm>
-            <a:off x="1581150" y="414337"/>
-            <a:ext cx="9029700" cy="6029325"/>
+            <a:off x="1376624" y="341643"/>
+            <a:ext cx="9766997" cy="6129495"/>
           </a:xfrm>
           <a:prstGeom prst="rect">
             <a:avLst/>
           </a:prstGeom>
-          <a:ln w="228600" cap="sq" cmpd="thickThin">
-            <a:solidFill>
-              <a:srgbClr val="7030A0"/>
-            </a:solidFill>
-            <a:prstDash val="solid"/>
-            <a:miter lim="800000"/>
-          </a:ln>
-          <a:effectLst>
-            <a:innerShdw blurRad="76200">
-              <a:srgbClr val="000000"/>
-            </a:innerShdw>
-          </a:effectLst>
         </p:spPr>
       </p:pic>
     </p:spTree>
     <p:extLst>
       <p:ext uri="{BB962C8B-B14F-4D97-AF65-F5344CB8AC3E}">
-        <p14:creationId xmlns:p14="http://schemas.microsoft.com/office/powerpoint/2010/main" val="1098800373"/>
+        <p14:creationId xmlns:p14="http://schemas.microsoft.com/office/powerpoint/2010/main" val="2755777187"/>
       </p:ext>
     </p:extLst>
   </p:cSld>
@@ -3015,9 +3187,19 @@
 </p:sld>
 </file>
 
-<file path=ppt/slides/slide2.xml><?xml version="1.0" encoding="utf-8"?>
+<file path=ppt/slides/slide3.xml><?xml version="1.0" encoding="utf-8"?>
 <p:sld xmlns:a="http://schemas.openxmlformats.org/drawingml/2006/main" xmlns:r="http://schemas.openxmlformats.org/officeDocument/2006/relationships" xmlns:p="http://schemas.openxmlformats.org/presentationml/2006/main">
   <p:cSld>
+    <p:bg>
+      <p:bgPr>
+        <a:solidFill>
+          <a:schemeClr val="bg2">
+            <a:lumMod val="75000"/>
+          </a:schemeClr>
+        </a:solidFill>
+        <a:effectLst/>
+      </p:bgPr>
+    </p:bg>
     <p:spTree>
       <p:nvGrpSpPr>
         <p:cNvPr id="1" name=""/>
@@ -3034,110 +3216,37 @@
       </p:grpSpPr>
       <p:pic>
         <p:nvPicPr>
-          <p:cNvPr id="4" name="Imagen 3"/>
+          <p:cNvPr id="4" name="Marcador de contenido 3"/>
           <p:cNvPicPr>
-            <a:picLocks noChangeAspect="1"/>
+            <a:picLocks noGrp="1" noChangeAspect="1"/>
           </p:cNvPicPr>
-          <p:nvPr/>
+          <p:nvPr>
+            <p:ph idx="1"/>
+          </p:nvPr>
         </p:nvPicPr>
         <p:blipFill>
-          <a:blip r:embed="rId2"/>
+          <a:blip r:embed="rId2">
+            <a:extLst>
+              <a:ext uri="{28A0092B-C50C-407E-A947-70E740481C1C}">
+                <a14:useLocalDpi xmlns:a14="http://schemas.microsoft.com/office/drawing/2010/main" val="0"/>
+              </a:ext>
+            </a:extLst>
+          </a:blip>
           <a:stretch>
             <a:fillRect/>
           </a:stretch>
         </p:blipFill>
         <p:spPr>
           <a:xfrm>
-            <a:off x="1214437" y="376237"/>
-            <a:ext cx="9763125" cy="6105525"/>
+            <a:off x="1564194" y="365125"/>
+            <a:ext cx="9063612" cy="6072179"/>
           </a:xfrm>
-          <a:prstGeom prst="rect">
-            <a:avLst/>
-          </a:prstGeom>
-          <a:ln w="228600" cap="sq" cmpd="thickThin">
-            <a:solidFill>
-              <a:srgbClr val="7030A0"/>
-            </a:solidFill>
-            <a:prstDash val="solid"/>
-            <a:miter lim="800000"/>
-          </a:ln>
-          <a:effectLst>
-            <a:innerShdw blurRad="76200">
-              <a:srgbClr val="000000"/>
-            </a:innerShdw>
-          </a:effectLst>
         </p:spPr>
       </p:pic>
     </p:spTree>
     <p:extLst>
       <p:ext uri="{BB962C8B-B14F-4D97-AF65-F5344CB8AC3E}">
-        <p14:creationId xmlns:p14="http://schemas.microsoft.com/office/powerpoint/2010/main" val="3053501745"/>
-      </p:ext>
-    </p:extLst>
-  </p:cSld>
-  <p:clrMapOvr>
-    <a:masterClrMapping/>
-  </p:clrMapOvr>
-</p:sld>
-</file>
-
-<file path=ppt/slides/slide3.xml><?xml version="1.0" encoding="utf-8"?>
-<p:sld xmlns:a="http://schemas.openxmlformats.org/drawingml/2006/main" xmlns:r="http://schemas.openxmlformats.org/officeDocument/2006/relationships" xmlns:p="http://schemas.openxmlformats.org/presentationml/2006/main">
-  <p:cSld>
-    <p:spTree>
-      <p:nvGrpSpPr>
-        <p:cNvPr id="1" name=""/>
-        <p:cNvGrpSpPr/>
-        <p:nvPr/>
-      </p:nvGrpSpPr>
-      <p:grpSpPr>
-        <a:xfrm>
-          <a:off x="0" y="0"/>
-          <a:ext cx="0" cy="0"/>
-          <a:chOff x="0" y="0"/>
-          <a:chExt cx="0" cy="0"/>
-        </a:xfrm>
-      </p:grpSpPr>
-      <p:pic>
-        <p:nvPicPr>
-          <p:cNvPr id="4" name="Imagen 3"/>
-          <p:cNvPicPr>
-            <a:picLocks noChangeAspect="1"/>
-          </p:cNvPicPr>
-          <p:nvPr/>
-        </p:nvPicPr>
-        <p:blipFill>
-          <a:blip r:embed="rId2"/>
-          <a:stretch>
-            <a:fillRect/>
-          </a:stretch>
-        </p:blipFill>
-        <p:spPr>
-          <a:xfrm>
-            <a:off x="1174079" y="392781"/>
-            <a:ext cx="10313572" cy="5494672"/>
-          </a:xfrm>
-          <a:prstGeom prst="rect">
-            <a:avLst/>
-          </a:prstGeom>
-          <a:ln w="228600" cap="sq" cmpd="thickThin">
-            <a:solidFill>
-              <a:srgbClr val="7030A0"/>
-            </a:solidFill>
-            <a:prstDash val="solid"/>
-            <a:miter lim="800000"/>
-          </a:ln>
-          <a:effectLst>
-            <a:innerShdw blurRad="76200">
-              <a:srgbClr val="000000"/>
-            </a:innerShdw>
-          </a:effectLst>
-        </p:spPr>
-      </p:pic>
-    </p:spTree>
-    <p:extLst>
-      <p:ext uri="{BB962C8B-B14F-4D97-AF65-F5344CB8AC3E}">
-        <p14:creationId xmlns:p14="http://schemas.microsoft.com/office/powerpoint/2010/main" val="1582955174"/>
+        <p14:creationId xmlns:p14="http://schemas.microsoft.com/office/powerpoint/2010/main" val="1199086444"/>
       </p:ext>
     </p:extLst>
   </p:cSld>

</xml_diff>